<commit_message>
adicionei slide de demonstração
</commit_message>
<xml_diff>
--- a/documentacao/Apresentação.pptx
+++ b/documentacao/Apresentação.pptx
@@ -5,10 +5,10 @@
     <p:sldMasterId id="2147483648" r:id="rId1"/>
   </p:sldMasterIdLst>
   <p:notesMasterIdLst>
-    <p:notesMasterId r:id="rId36"/>
+    <p:notesMasterId r:id="rId37"/>
   </p:notesMasterIdLst>
   <p:handoutMasterIdLst>
-    <p:handoutMasterId r:id="rId37"/>
+    <p:handoutMasterId r:id="rId38"/>
   </p:handoutMasterIdLst>
   <p:sldIdLst>
     <p:sldId id="257" r:id="rId2"/>
@@ -41,10 +41,11 @@
     <p:sldId id="298" r:id="rId29"/>
     <p:sldId id="299" r:id="rId30"/>
     <p:sldId id="300" r:id="rId31"/>
-    <p:sldId id="301" r:id="rId32"/>
-    <p:sldId id="274" r:id="rId33"/>
-    <p:sldId id="285" r:id="rId34"/>
-    <p:sldId id="266" r:id="rId35"/>
+    <p:sldId id="306" r:id="rId32"/>
+    <p:sldId id="301" r:id="rId33"/>
+    <p:sldId id="274" r:id="rId34"/>
+    <p:sldId id="285" r:id="rId35"/>
+    <p:sldId id="266" r:id="rId36"/>
   </p:sldIdLst>
   <p:sldSz cx="12192000" cy="6858000"/>
   <p:notesSz cx="6858000" cy="9144000"/>
@@ -2891,7 +2892,7 @@
             <a:pPr rtl="0"/>
             <a:fld id="{1B9A179D-2D27-49E2-B022-8EDDA2EFE682}" type="slidenum">
               <a:rPr lang="pt-BR" smtClean="0"/>
-              <a:t>31</a:t>
+              <a:t>32</a:t>
             </a:fld>
             <a:endParaRPr lang="pt-BR" dirty="0"/>
           </a:p>
@@ -2987,7 +2988,7 @@
             <a:pPr rtl="0"/>
             <a:fld id="{1B9A179D-2D27-49E2-B022-8EDDA2EFE682}" type="slidenum">
               <a:rPr lang="pt-BR" smtClean="0"/>
-              <a:t>33</a:t>
+              <a:t>34</a:t>
             </a:fld>
             <a:endParaRPr lang="pt-BR" dirty="0"/>
           </a:p>
@@ -3072,7 +3073,7 @@
             <a:pPr rtl="0"/>
             <a:fld id="{1B9A179D-2D27-49E2-B022-8EDDA2EFE682}" type="slidenum">
               <a:rPr lang="pt-BR" smtClean="0"/>
-              <a:t>34</a:t>
+              <a:t>35</a:t>
             </a:fld>
             <a:endParaRPr lang="pt-BR" dirty="0"/>
           </a:p>
@@ -4298,10 +4299,9 @@
           <a:p>
             <a:pPr rtl="0"/>
             <a:r>
-              <a:rPr lang="pt-BR" noProof="0"/>
+              <a:rPr lang="pt-BR" noProof="0" dirty="0"/>
               <a:t>Clique no ícone para adicionar uma imagem</a:t>
             </a:r>
-            <a:endParaRPr lang="pt-BR" noProof="0" dirty="0"/>
           </a:p>
         </p:txBody>
       </p:sp>
@@ -4766,10 +4766,9 @@
           <a:p>
             <a:pPr rtl="0"/>
             <a:r>
-              <a:rPr lang="pt-BR" noProof="0"/>
+              <a:rPr lang="pt-BR" noProof="0" dirty="0"/>
               <a:t>Clique no ícone para adicionar uma imagem</a:t>
             </a:r>
-            <a:endParaRPr lang="pt-BR" noProof="0" dirty="0"/>
           </a:p>
         </p:txBody>
       </p:sp>
@@ -4908,10 +4907,9 @@
           <a:p>
             <a:pPr rtl="0"/>
             <a:r>
-              <a:rPr lang="pt-BR" noProof="0"/>
+              <a:rPr lang="pt-BR" noProof="0" dirty="0"/>
               <a:t>Clique no ícone para adicionar uma imagem</a:t>
             </a:r>
-            <a:endParaRPr lang="pt-BR" noProof="0" dirty="0"/>
           </a:p>
         </p:txBody>
       </p:sp>
@@ -6170,10 +6168,9 @@
           <a:p>
             <a:pPr rtl="0"/>
             <a:r>
-              <a:rPr lang="pt-BR" noProof="0"/>
+              <a:rPr lang="pt-BR" noProof="0" dirty="0"/>
               <a:t>Clique no ícone para adicionar uma imagem</a:t>
             </a:r>
-            <a:endParaRPr lang="pt-BR" noProof="0" dirty="0"/>
           </a:p>
         </p:txBody>
       </p:sp>
@@ -8759,7 +8756,7 @@
           <a:bodyPr/>
           <a:lstStyle/>
           <a:p>
-            <a:endParaRPr lang="pt-BR"/>
+            <a:endParaRPr lang="pt-BR" dirty="0"/>
           </a:p>
         </p:txBody>
       </p:sp>
@@ -17457,6 +17454,174 @@
           <a:chExt cx="0" cy="0"/>
         </a:xfrm>
       </p:grpSpPr>
+      <p:sp>
+        <p:nvSpPr>
+          <p:cNvPr id="2" name="Título 1">
+            <a:extLst>
+              <a:ext uri="{FF2B5EF4-FFF2-40B4-BE49-F238E27FC236}">
+                <a16:creationId xmlns:a16="http://schemas.microsoft.com/office/drawing/2014/main" id="{A8105C9A-20D0-4A00-9D0A-A8B3207BAE62}"/>
+              </a:ext>
+            </a:extLst>
+          </p:cNvPr>
+          <p:cNvSpPr>
+            <a:spLocks noGrp="1"/>
+          </p:cNvSpPr>
+          <p:nvPr>
+            <p:ph type="title"/>
+          </p:nvPr>
+        </p:nvSpPr>
+        <p:spPr/>
+        <p:txBody>
+          <a:bodyPr/>
+          <a:lstStyle/>
+          <a:p>
+            <a:r>
+              <a:rPr lang="pt-BR" dirty="0"/>
+              <a:t>Demonstração do Site</a:t>
+            </a:r>
+          </a:p>
+        </p:txBody>
+      </p:sp>
+      <p:pic>
+        <p:nvPicPr>
+          <p:cNvPr id="6" name="Imagem 5">
+            <a:extLst>
+              <a:ext uri="{FF2B5EF4-FFF2-40B4-BE49-F238E27FC236}">
+                <a16:creationId xmlns:a16="http://schemas.microsoft.com/office/drawing/2014/main" id="{6040BF6C-836F-477C-9527-4A158F86F927}"/>
+              </a:ext>
+            </a:extLst>
+          </p:cNvPr>
+          <p:cNvPicPr>
+            <a:picLocks noChangeAspect="1"/>
+          </p:cNvPicPr>
+          <p:nvPr/>
+        </p:nvPicPr>
+        <p:blipFill>
+          <a:blip r:embed="rId2"/>
+          <a:stretch>
+            <a:fillRect/>
+          </a:stretch>
+        </p:blipFill>
+        <p:spPr>
+          <a:xfrm>
+            <a:off x="3228975" y="2098323"/>
+            <a:ext cx="5462586" cy="4247367"/>
+          </a:xfrm>
+          <a:prstGeom prst="rect">
+            <a:avLst/>
+          </a:prstGeom>
+        </p:spPr>
+      </p:pic>
+      <p:pic>
+        <p:nvPicPr>
+          <p:cNvPr id="7" name="Imagem 6">
+            <a:extLst>
+              <a:ext uri="{FF2B5EF4-FFF2-40B4-BE49-F238E27FC236}">
+                <a16:creationId xmlns:a16="http://schemas.microsoft.com/office/drawing/2014/main" id="{B456F8B9-E304-4FA4-9D1F-1087B7A3001E}"/>
+              </a:ext>
+            </a:extLst>
+          </p:cNvPr>
+          <p:cNvPicPr>
+            <a:picLocks noChangeAspect="1"/>
+          </p:cNvPicPr>
+          <p:nvPr/>
+        </p:nvPicPr>
+        <p:blipFill rotWithShape="1">
+          <a:blip r:embed="rId3"/>
+          <a:srcRect l="4270" r="4358"/>
+          <a:stretch/>
+        </p:blipFill>
+        <p:spPr>
+          <a:xfrm>
+            <a:off x="3428999" y="2314935"/>
+            <a:ext cx="5057775" cy="2499954"/>
+          </a:xfrm>
+          <a:prstGeom prst="rect">
+            <a:avLst/>
+          </a:prstGeom>
+        </p:spPr>
+      </p:pic>
+      <p:pic>
+        <p:nvPicPr>
+          <p:cNvPr id="9" name="Imagem 8">
+            <a:hlinkClick r:id="rId4"/>
+            <a:extLst>
+              <a:ext uri="{FF2B5EF4-FFF2-40B4-BE49-F238E27FC236}">
+                <a16:creationId xmlns:a16="http://schemas.microsoft.com/office/drawing/2014/main" id="{7BE65E1B-1953-4D07-BFEE-856D780396B5}"/>
+              </a:ext>
+            </a:extLst>
+          </p:cNvPr>
+          <p:cNvPicPr>
+            <a:picLocks noChangeAspect="1"/>
+          </p:cNvPicPr>
+          <p:nvPr/>
+        </p:nvPicPr>
+        <p:blipFill>
+          <a:blip r:embed="rId5">
+            <a:duotone>
+              <a:schemeClr val="accent2">
+                <a:shade val="45000"/>
+                <a:satMod val="135000"/>
+              </a:schemeClr>
+              <a:prstClr val="white"/>
+            </a:duotone>
+          </a:blip>
+          <a:stretch>
+            <a:fillRect/>
+          </a:stretch>
+        </p:blipFill>
+        <p:spPr>
+          <a:xfrm>
+            <a:off x="5295470" y="2764382"/>
+            <a:ext cx="1601060" cy="1601060"/>
+          </a:xfrm>
+          <a:prstGeom prst="rect">
+            <a:avLst/>
+          </a:prstGeom>
+        </p:spPr>
+      </p:pic>
+    </p:spTree>
+    <p:extLst>
+      <p:ext uri="{BB962C8B-B14F-4D97-AF65-F5344CB8AC3E}">
+        <p14:creationId xmlns:p14="http://schemas.microsoft.com/office/powerpoint/2010/main" val="183370145"/>
+      </p:ext>
+    </p:extLst>
+  </p:cSld>
+  <p:clrMapOvr>
+    <a:masterClrMapping/>
+  </p:clrMapOvr>
+  <mc:AlternateContent xmlns:mc="http://schemas.openxmlformats.org/markup-compatibility/2006" xmlns:p14="http://schemas.microsoft.com/office/powerpoint/2010/main">
+    <mc:Choice Requires="p14">
+      <p:transition spd="med" p14:dur="700">
+        <p:fade/>
+      </p:transition>
+    </mc:Choice>
+    <mc:Fallback xmlns="">
+      <p:transition spd="med">
+        <p:fade/>
+      </p:transition>
+    </mc:Fallback>
+  </mc:AlternateContent>
+</p:sld>
+</file>
+
+<file path=ppt/slides/slide32.xml><?xml version="1.0" encoding="utf-8"?>
+<p:sld xmlns:a="http://schemas.openxmlformats.org/drawingml/2006/main" xmlns:r="http://schemas.openxmlformats.org/officeDocument/2006/relationships" xmlns:p="http://schemas.openxmlformats.org/presentationml/2006/main">
+  <p:cSld>
+    <p:spTree>
+      <p:nvGrpSpPr>
+        <p:cNvPr id="1" name=""/>
+        <p:cNvGrpSpPr/>
+        <p:nvPr/>
+      </p:nvGrpSpPr>
+      <p:grpSpPr>
+        <a:xfrm>
+          <a:off x="0" y="0"/>
+          <a:ext cx="0" cy="0"/>
+          <a:chOff x="0" y="0"/>
+          <a:chExt cx="0" cy="0"/>
+        </a:xfrm>
+      </p:grpSpPr>
       <p:pic>
         <p:nvPicPr>
           <p:cNvPr id="7" name="Imagem 6" descr="Uma imagem contendo kit de primeiros socorros, objeto&#10;&#10;Descrição gerada automaticamente">
@@ -17897,7 +18062,7 @@
           <a:lstStyle/>
           <a:p>
             <a:pPr algn="ctr"/>
-            <a:endParaRPr lang="pt-BR"/>
+            <a:endParaRPr lang="pt-BR" dirty="0"/>
           </a:p>
         </p:txBody>
       </p:sp>
@@ -17945,7 +18110,7 @@
           <a:lstStyle/>
           <a:p>
             <a:pPr algn="ctr"/>
-            <a:endParaRPr lang="pt-BR"/>
+            <a:endParaRPr lang="pt-BR" dirty="0"/>
           </a:p>
         </p:txBody>
       </p:sp>
@@ -17993,7 +18158,7 @@
           <a:lstStyle/>
           <a:p>
             <a:pPr algn="ctr"/>
-            <a:endParaRPr lang="pt-BR"/>
+            <a:endParaRPr lang="pt-BR" dirty="0"/>
           </a:p>
         </p:txBody>
       </p:sp>
@@ -18041,7 +18206,7 @@
           <a:lstStyle/>
           <a:p>
             <a:pPr algn="ctr"/>
-            <a:endParaRPr lang="pt-BR"/>
+            <a:endParaRPr lang="pt-BR" dirty="0"/>
           </a:p>
         </p:txBody>
       </p:sp>
@@ -18089,7 +18254,7 @@
           <a:lstStyle/>
           <a:p>
             <a:pPr algn="ctr"/>
-            <a:endParaRPr lang="pt-BR"/>
+            <a:endParaRPr lang="pt-BR" dirty="0"/>
           </a:p>
         </p:txBody>
       </p:sp>
@@ -18137,7 +18302,7 @@
           <a:lstStyle/>
           <a:p>
             <a:pPr algn="ctr"/>
-            <a:endParaRPr lang="pt-BR"/>
+            <a:endParaRPr lang="pt-BR" dirty="0"/>
           </a:p>
         </p:txBody>
       </p:sp>
@@ -18185,7 +18350,7 @@
           <a:lstStyle/>
           <a:p>
             <a:pPr algn="ctr"/>
-            <a:endParaRPr lang="pt-BR"/>
+            <a:endParaRPr lang="pt-BR" dirty="0"/>
           </a:p>
         </p:txBody>
       </p:sp>
@@ -18233,7 +18398,7 @@
           <a:lstStyle/>
           <a:p>
             <a:pPr algn="ctr"/>
-            <a:endParaRPr lang="pt-BR"/>
+            <a:endParaRPr lang="pt-BR" dirty="0"/>
           </a:p>
         </p:txBody>
       </p:sp>
@@ -18281,7 +18446,7 @@
           <a:lstStyle/>
           <a:p>
             <a:pPr algn="ctr"/>
-            <a:endParaRPr lang="pt-BR"/>
+            <a:endParaRPr lang="pt-BR" dirty="0"/>
           </a:p>
         </p:txBody>
       </p:sp>
@@ -18376,7 +18541,7 @@
 </p:sld>
 </file>
 
-<file path=ppt/slides/slide32.xml><?xml version="1.0" encoding="utf-8"?>
+<file path=ppt/slides/slide33.xml><?xml version="1.0" encoding="utf-8"?>
 <p:sld xmlns:a="http://schemas.openxmlformats.org/drawingml/2006/main" xmlns:r="http://schemas.openxmlformats.org/officeDocument/2006/relationships" xmlns:p="http://schemas.openxmlformats.org/presentationml/2006/main">
   <p:cSld>
     <p:spTree>
@@ -18837,7 +19002,7 @@
 </p:sld>
 </file>
 
-<file path=ppt/slides/slide33.xml><?xml version="1.0" encoding="utf-8"?>
+<file path=ppt/slides/slide34.xml><?xml version="1.0" encoding="utf-8"?>
 <p:sld xmlns:a="http://schemas.openxmlformats.org/drawingml/2006/main" xmlns:r="http://schemas.openxmlformats.org/officeDocument/2006/relationships" xmlns:p="http://schemas.openxmlformats.org/presentationml/2006/main">
   <p:cSld>
     <p:spTree>
@@ -19055,7 +19220,7 @@
           <a:lstStyle/>
           <a:p>
             <a:pPr algn="ctr"/>
-            <a:endParaRPr lang="pt-BR"/>
+            <a:endParaRPr lang="pt-BR" dirty="0"/>
           </a:p>
         </p:txBody>
       </p:sp>
@@ -19103,7 +19268,7 @@
           <a:lstStyle/>
           <a:p>
             <a:pPr algn="ctr"/>
-            <a:endParaRPr lang="pt-BR"/>
+            <a:endParaRPr lang="pt-BR" dirty="0"/>
           </a:p>
         </p:txBody>
       </p:sp>
@@ -19151,7 +19316,7 @@
           <a:lstStyle/>
           <a:p>
             <a:pPr algn="ctr"/>
-            <a:endParaRPr lang="pt-BR"/>
+            <a:endParaRPr lang="pt-BR" dirty="0"/>
           </a:p>
         </p:txBody>
       </p:sp>
@@ -19209,7 +19374,7 @@
 </p:sld>
 </file>
 
-<file path=ppt/slides/slide34.xml><?xml version="1.0" encoding="utf-8"?>
+<file path=ppt/slides/slide35.xml><?xml version="1.0" encoding="utf-8"?>
 <p:sld xmlns:a="http://schemas.openxmlformats.org/drawingml/2006/main" xmlns:r="http://schemas.openxmlformats.org/officeDocument/2006/relationships" xmlns:p="http://schemas.openxmlformats.org/presentationml/2006/main">
   <p:cSld>
     <p:spTree>
@@ -21171,39 +21336,6 @@
               <a:rPr lang="pt-BR" dirty="0"/>
               <a:t> Economia de energia e tempo.</a:t>
             </a:r>
-          </a:p>
-          <a:p>
-            <a:pPr>
-              <a:buFont typeface="Arial" panose="020B0604020202020204" pitchFamily="34" charset="0"/>
-              <a:buBlip>
-                <a:blip r:embed="rId3"/>
-              </a:buBlip>
-            </a:pPr>
-            <a:r>
-              <a:rPr lang="pt-BR" dirty="0"/>
-              <a:t> Como funciona.</a:t>
-            </a:r>
-          </a:p>
-          <a:p>
-            <a:pPr>
-              <a:buFont typeface="Arial" panose="020B0604020202020204" pitchFamily="34" charset="0"/>
-              <a:buBlip>
-                <a:blip r:embed="rId3"/>
-              </a:buBlip>
-            </a:pPr>
-            <a:r>
-              <a:rPr lang="pt-BR" dirty="0"/>
-              <a:t> Tecnologias e ferramentas utilizadas.</a:t>
-            </a:r>
-          </a:p>
-          <a:p>
-            <a:pPr>
-              <a:buFont typeface="Arial" panose="020B0604020202020204" pitchFamily="34" charset="0"/>
-              <a:buBlip>
-                <a:blip r:embed="rId3"/>
-              </a:buBlip>
-            </a:pPr>
-            <a:endParaRPr lang="pt-BR" dirty="0"/>
           </a:p>
           <a:p>
             <a:pPr>

</xml_diff>

<commit_message>
Alterações no ppt - @virtohoho
</commit_message>
<xml_diff>
--- a/documentacao/Apresentação.pptx
+++ b/documentacao/Apresentação.pptx
@@ -5,10 +5,10 @@
     <p:sldMasterId id="2147483648" r:id="rId1"/>
   </p:sldMasterIdLst>
   <p:notesMasterIdLst>
-    <p:notesMasterId r:id="rId40"/>
+    <p:notesMasterId r:id="rId39"/>
   </p:notesMasterIdLst>
   <p:handoutMasterIdLst>
-    <p:handoutMasterId r:id="rId41"/>
+    <p:handoutMasterId r:id="rId40"/>
   </p:handoutMasterIdLst>
   <p:sldIdLst>
     <p:sldId id="257" r:id="rId2"/>
@@ -36,19 +36,18 @@
     <p:sldId id="309" r:id="rId24"/>
     <p:sldId id="292" r:id="rId25"/>
     <p:sldId id="302" r:id="rId26"/>
-    <p:sldId id="304" r:id="rId27"/>
+    <p:sldId id="312" r:id="rId27"/>
     <p:sldId id="295" r:id="rId28"/>
     <p:sldId id="293" r:id="rId29"/>
     <p:sldId id="310" r:id="rId30"/>
     <p:sldId id="308" r:id="rId31"/>
-    <p:sldId id="298" r:id="rId32"/>
-    <p:sldId id="299" r:id="rId33"/>
-    <p:sldId id="300" r:id="rId34"/>
-    <p:sldId id="306" r:id="rId35"/>
-    <p:sldId id="301" r:id="rId36"/>
-    <p:sldId id="274" r:id="rId37"/>
-    <p:sldId id="285" r:id="rId38"/>
-    <p:sldId id="266" r:id="rId39"/>
+    <p:sldId id="300" r:id="rId32"/>
+    <p:sldId id="311" r:id="rId33"/>
+    <p:sldId id="306" r:id="rId34"/>
+    <p:sldId id="301" r:id="rId35"/>
+    <p:sldId id="274" r:id="rId36"/>
+    <p:sldId id="285" r:id="rId37"/>
+    <p:sldId id="266" r:id="rId38"/>
   </p:sldIdLst>
   <p:sldSz cx="12192000" cy="6858000"/>
   <p:notesSz cx="6858000" cy="9144000"/>
@@ -173,7 +172,7 @@
 <file path=ppt/charts/chart1.xml><?xml version="1.0" encoding="utf-8"?>
 <c:chartSpace xmlns:c="http://schemas.openxmlformats.org/drawingml/2006/chart" xmlns:a="http://schemas.openxmlformats.org/drawingml/2006/main" xmlns:r="http://schemas.openxmlformats.org/officeDocument/2006/relationships" xmlns:c16r2="http://schemas.microsoft.com/office/drawing/2015/06/chart">
   <c:date1904 val="0"/>
-  <c:lang val="en-US"/>
+  <c:lang val="pt-BR"/>
   <c:roundedCorners val="0"/>
   <mc:AlternateContent xmlns:mc="http://schemas.openxmlformats.org/markup-compatibility/2006">
     <mc:Choice xmlns:c14="http://schemas.microsoft.com/office/drawing/2007/8/2/chart" Requires="c14">
@@ -1812,7 +1811,7 @@
             <a:pPr rtl="0"/>
             <a:fld id="{F769B0D5-7F55-455B-B769-84B61581E250}" type="datetime1">
               <a:rPr lang="pt-BR" smtClean="0"/>
-              <a:t>01/06/2019</a:t>
+              <a:t>03/06/2019</a:t>
             </a:fld>
             <a:endParaRPr lang="pt-BR" dirty="0"/>
           </a:p>
@@ -1880,7 +1879,7 @@
             <a:pPr rtl="0"/>
             <a:fld id="{84A4F617-7A30-41D4-AB86-5D833C98E18B}" type="slidenum">
               <a:rPr lang="pt-BR" smtClean="0"/>
-              <a:t>‹#›</a:t>
+              <a:t>‹nº›</a:t>
             </a:fld>
             <a:endParaRPr lang="pt-BR" dirty="0"/>
           </a:p>
@@ -1982,7 +1981,7 @@
             <a:pPr rtl="0"/>
             <a:fld id="{1AFE56F6-A70B-491B-A989-29E38C94819E}" type="datetime1">
               <a:rPr lang="pt-BR" noProof="0" smtClean="0"/>
-              <a:t>01/06/2019</a:t>
+              <a:t>03/06/2019</a:t>
             </a:fld>
             <a:endParaRPr lang="pt-BR" noProof="0" dirty="0"/>
           </a:p>
@@ -2143,7 +2142,7 @@
             <a:pPr rtl="0"/>
             <a:fld id="{1B9A179D-2D27-49E2-B022-8EDDA2EFE682}" type="slidenum">
               <a:rPr lang="pt-BR" noProof="0" smtClean="0"/>
-              <a:t>‹#›</a:t>
+              <a:t>‹nº›</a:t>
             </a:fld>
             <a:endParaRPr lang="pt-BR" noProof="0" dirty="0"/>
           </a:p>
@@ -2991,7 +2990,7 @@
             <a:pPr rtl="0"/>
             <a:fld id="{1B9A179D-2D27-49E2-B022-8EDDA2EFE682}" type="slidenum">
               <a:rPr lang="pt-BR" smtClean="0"/>
-              <a:t>35</a:t>
+              <a:t>34</a:t>
             </a:fld>
             <a:endParaRPr lang="pt-BR" dirty="0"/>
           </a:p>
@@ -3076,7 +3075,7 @@
             <a:pPr rtl="0"/>
             <a:fld id="{1B9A179D-2D27-49E2-B022-8EDDA2EFE682}" type="slidenum">
               <a:rPr lang="pt-BR" noProof="0" smtClean="0"/>
-              <a:t>36</a:t>
+              <a:t>35</a:t>
             </a:fld>
             <a:endParaRPr lang="pt-BR" noProof="0" dirty="0"/>
           </a:p>
@@ -3172,7 +3171,7 @@
             <a:pPr rtl="0"/>
             <a:fld id="{1B9A179D-2D27-49E2-B022-8EDDA2EFE682}" type="slidenum">
               <a:rPr lang="pt-BR" smtClean="0"/>
-              <a:t>37</a:t>
+              <a:t>36</a:t>
             </a:fld>
             <a:endParaRPr lang="pt-BR" dirty="0"/>
           </a:p>
@@ -3257,7 +3256,7 @@
             <a:pPr rtl="0"/>
             <a:fld id="{1B9A179D-2D27-49E2-B022-8EDDA2EFE682}" type="slidenum">
               <a:rPr lang="pt-BR" smtClean="0"/>
-              <a:t>38</a:t>
+              <a:t>37</a:t>
             </a:fld>
             <a:endParaRPr lang="pt-BR" dirty="0"/>
           </a:p>
@@ -4600,7 +4599,7 @@
             <a:pPr rtl="0"/>
             <a:fld id="{ED540BCD-A9BE-4069-AF5C-2A3DFF693F79}" type="datetime1">
               <a:rPr lang="pt-BR" noProof="0" smtClean="0"/>
-              <a:t>01/06/2019</a:t>
+              <a:t>03/06/2019</a:t>
             </a:fld>
             <a:endParaRPr lang="pt-BR" noProof="0" dirty="0"/>
           </a:p>
@@ -4624,7 +4623,7 @@
             <a:pPr rtl="0"/>
             <a:fld id="{A7F8E3F6-DE14-48B2-B2BC-6FABA9630FB8}" type="slidenum">
               <a:rPr lang="pt-BR" noProof="0" smtClean="0"/>
-              <a:t>‹#›</a:t>
+              <a:t>‹nº›</a:t>
             </a:fld>
             <a:endParaRPr lang="pt-BR" noProof="0" dirty="0"/>
           </a:p>
@@ -5212,7 +5211,7 @@
             <a:pPr rtl="0"/>
             <a:fld id="{1CECCB52-40C2-4E99-85EA-E8A293866E2D}" type="datetime1">
               <a:rPr lang="pt-BR" noProof="0" smtClean="0"/>
-              <a:t>01/06/2019</a:t>
+              <a:t>03/06/2019</a:t>
             </a:fld>
             <a:endParaRPr lang="pt-BR" noProof="0" dirty="0"/>
           </a:p>
@@ -5236,7 +5235,7 @@
             <a:pPr rtl="0"/>
             <a:fld id="{A7F8E3F6-DE14-48B2-B2BC-6FABA9630FB8}" type="slidenum">
               <a:rPr lang="pt-BR" noProof="0" smtClean="0"/>
-              <a:t>‹#›</a:t>
+              <a:t>‹nº›</a:t>
             </a:fld>
             <a:endParaRPr lang="pt-BR" noProof="0" dirty="0"/>
           </a:p>
@@ -5401,7 +5400,7 @@
             <a:pPr rtl="0"/>
             <a:fld id="{E24EF33E-C11E-476F-ABF9-879EF9D37700}" type="datetime1">
               <a:rPr lang="pt-BR" noProof="0" smtClean="0"/>
-              <a:t>01/06/2019</a:t>
+              <a:t>03/06/2019</a:t>
             </a:fld>
             <a:endParaRPr lang="pt-BR" noProof="0" dirty="0"/>
           </a:p>
@@ -5425,7 +5424,7 @@
             <a:pPr rtl="0"/>
             <a:fld id="{A7F8E3F6-DE14-48B2-B2BC-6FABA9630FB8}" type="slidenum">
               <a:rPr lang="pt-BR" noProof="0" smtClean="0"/>
-              <a:t>‹#›</a:t>
+              <a:t>‹nº›</a:t>
             </a:fld>
             <a:endParaRPr lang="pt-BR" noProof="0" dirty="0"/>
           </a:p>
@@ -5740,7 +5739,7 @@
             <a:pPr rtl="0"/>
             <a:fld id="{AF3A9F66-FD54-49C7-9D08-483FEB75E766}" type="datetime1">
               <a:rPr lang="pt-BR" noProof="0" smtClean="0"/>
-              <a:t>01/06/2019</a:t>
+              <a:t>03/06/2019</a:t>
             </a:fld>
             <a:endParaRPr lang="pt-BR" noProof="0" dirty="0"/>
           </a:p>
@@ -5773,7 +5772,7 @@
             <a:fld id="{A7F8E3F6-DE14-48B2-B2BC-6FABA9630FB8}" type="slidenum">
               <a:rPr lang="pt-BR" noProof="0" smtClean="0"/>
               <a:pPr rtl="0"/>
-              <a:t>‹#›</a:t>
+              <a:t>‹nº›</a:t>
             </a:fld>
             <a:endParaRPr lang="pt-BR" noProof="0" dirty="0"/>
           </a:p>
@@ -5938,7 +5937,7 @@
             <a:pPr rtl="0"/>
             <a:fld id="{B76F022E-73DC-465B-A81F-663C39E9C6BC}" type="datetime1">
               <a:rPr lang="pt-BR" noProof="0" smtClean="0"/>
-              <a:t>01/06/2019</a:t>
+              <a:t>03/06/2019</a:t>
             </a:fld>
             <a:endParaRPr lang="pt-BR" noProof="0" dirty="0"/>
           </a:p>
@@ -5962,7 +5961,7 @@
             <a:pPr rtl="0"/>
             <a:fld id="{A7F8E3F6-DE14-48B2-B2BC-6FABA9630FB8}" type="slidenum">
               <a:rPr lang="pt-BR" noProof="0" smtClean="0"/>
-              <a:t>‹#›</a:t>
+              <a:t>‹nº›</a:t>
             </a:fld>
             <a:endParaRPr lang="pt-BR" noProof="0" dirty="0"/>
           </a:p>
@@ -7116,7 +7115,7 @@
             <a:pPr rtl="0"/>
             <a:fld id="{D032D7E7-0E3D-42EA-B60A-46262A5D0676}" type="datetime1">
               <a:rPr lang="pt-BR" noProof="0" smtClean="0"/>
-              <a:t>01/06/2019</a:t>
+              <a:t>03/06/2019</a:t>
             </a:fld>
             <a:endParaRPr lang="pt-BR" noProof="0" dirty="0"/>
           </a:p>
@@ -7140,7 +7139,7 @@
             <a:pPr rtl="0"/>
             <a:fld id="{A7F8E3F6-DE14-48B2-B2BC-6FABA9630FB8}" type="slidenum">
               <a:rPr lang="pt-BR" noProof="0" smtClean="0"/>
-              <a:t>‹#›</a:t>
+              <a:t>‹nº›</a:t>
             </a:fld>
             <a:endParaRPr lang="pt-BR" noProof="0" dirty="0"/>
           </a:p>
@@ -7506,7 +7505,7 @@
             <a:pPr rtl="0"/>
             <a:fld id="{A0DCB2DA-9F14-430D-AF4F-64B6EB5E00E7}" type="datetime1">
               <a:rPr lang="pt-BR" noProof="0" smtClean="0"/>
-              <a:t>01/06/2019</a:t>
+              <a:t>03/06/2019</a:t>
             </a:fld>
             <a:endParaRPr lang="pt-BR" noProof="0" dirty="0"/>
           </a:p>
@@ -7530,7 +7529,7 @@
             <a:pPr rtl="0"/>
             <a:fld id="{A7F8E3F6-DE14-48B2-B2BC-6FABA9630FB8}" type="slidenum">
               <a:rPr lang="pt-BR" noProof="0" smtClean="0"/>
-              <a:t>‹#›</a:t>
+              <a:t>‹nº›</a:t>
             </a:fld>
             <a:endParaRPr lang="pt-BR" noProof="0" dirty="0"/>
           </a:p>
@@ -7643,7 +7642,7 @@
             <a:pPr rtl="0"/>
             <a:fld id="{58A91CED-09DA-4ECE-92C8-759A4ED95185}" type="datetime1">
               <a:rPr lang="pt-BR" noProof="0" smtClean="0"/>
-              <a:t>01/06/2019</a:t>
+              <a:t>03/06/2019</a:t>
             </a:fld>
             <a:endParaRPr lang="pt-BR" noProof="0" dirty="0"/>
           </a:p>
@@ -7667,7 +7666,7 @@
             <a:pPr rtl="0"/>
             <a:fld id="{A7F8E3F6-DE14-48B2-B2BC-6FABA9630FB8}" type="slidenum">
               <a:rPr lang="pt-BR" noProof="0" smtClean="0"/>
-              <a:t>‹#›</a:t>
+              <a:t>‹nº›</a:t>
             </a:fld>
             <a:endParaRPr lang="pt-BR" noProof="0" dirty="0"/>
           </a:p>
@@ -7756,7 +7755,7 @@
             <a:pPr rtl="0"/>
             <a:fld id="{84518F8F-CA65-4BFD-A461-B66071DAF05B}" type="datetime1">
               <a:rPr lang="pt-BR" noProof="0" smtClean="0"/>
-              <a:t>01/06/2019</a:t>
+              <a:t>03/06/2019</a:t>
             </a:fld>
             <a:endParaRPr lang="pt-BR" noProof="0" dirty="0"/>
           </a:p>
@@ -7780,7 +7779,7 @@
             <a:pPr rtl="0"/>
             <a:fld id="{A7F8E3F6-DE14-48B2-B2BC-6FABA9630FB8}" type="slidenum">
               <a:rPr lang="pt-BR" noProof="0" smtClean="0"/>
-              <a:t>‹#›</a:t>
+              <a:t>‹nº›</a:t>
             </a:fld>
             <a:endParaRPr lang="pt-BR" noProof="0" dirty="0"/>
           </a:p>
@@ -8054,7 +8053,7 @@
             <a:pPr rtl="0"/>
             <a:fld id="{1FF51EBE-146A-4C5F-B6C5-AA4426FEB226}" type="datetime1">
               <a:rPr lang="pt-BR" noProof="0" smtClean="0"/>
-              <a:t>01/06/2019</a:t>
+              <a:t>03/06/2019</a:t>
             </a:fld>
             <a:endParaRPr lang="pt-BR" noProof="0" dirty="0"/>
           </a:p>
@@ -8078,7 +8077,7 @@
             <a:pPr rtl="0"/>
             <a:fld id="{A7F8E3F6-DE14-48B2-B2BC-6FABA9630FB8}" type="slidenum">
               <a:rPr lang="pt-BR" noProof="0" smtClean="0"/>
-              <a:t>‹#›</a:t>
+              <a:t>‹nº›</a:t>
             </a:fld>
             <a:endParaRPr lang="pt-BR" noProof="0" dirty="0"/>
           </a:p>
@@ -8438,7 +8437,7 @@
             <a:pPr rtl="0"/>
             <a:fld id="{AF879DE6-BF0A-412B-BA5D-89651B90F81D}" type="datetime1">
               <a:rPr lang="pt-BR" noProof="0" smtClean="0"/>
-              <a:t>01/06/2019</a:t>
+              <a:t>03/06/2019</a:t>
             </a:fld>
             <a:endParaRPr lang="pt-BR" noProof="0" dirty="0"/>
           </a:p>
@@ -8479,7 +8478,7 @@
             <a:fld id="{A7F8E3F6-DE14-48B2-B2BC-6FABA9630FB8}" type="slidenum">
               <a:rPr lang="pt-BR" noProof="0" smtClean="0"/>
               <a:pPr rtl="0"/>
-              <a:t>‹#›</a:t>
+              <a:t>‹nº›</a:t>
             </a:fld>
             <a:endParaRPr lang="pt-BR" noProof="0" dirty="0"/>
           </a:p>
@@ -10713,18 +10712,9 @@
   <p:clrMapOvr>
     <a:masterClrMapping/>
   </p:clrMapOvr>
-  <mc:AlternateContent xmlns:mc="http://schemas.openxmlformats.org/markup-compatibility/2006" xmlns:p14="http://schemas.microsoft.com/office/powerpoint/2010/main">
-    <mc:Choice Requires="p14">
-      <p:transition spd="med" p14:dur="700">
-        <p:fade/>
-      </p:transition>
-    </mc:Choice>
-    <mc:Fallback xmlns="">
-      <p:transition spd="med">
-        <p:fade/>
-      </p:transition>
-    </mc:Fallback>
-  </mc:AlternateContent>
+  <p:transition spd="med">
+    <p:pull/>
+  </p:transition>
 </p:sld>
 </file>
 
@@ -12404,18 +12394,9 @@
   <p:clrMapOvr>
     <a:masterClrMapping/>
   </p:clrMapOvr>
-  <mc:AlternateContent xmlns:mc="http://schemas.openxmlformats.org/markup-compatibility/2006" xmlns:p14="http://schemas.microsoft.com/office/powerpoint/2010/main">
-    <mc:Choice Requires="p14">
-      <p:transition spd="med" p14:dur="700">
-        <p:fade/>
-      </p:transition>
-    </mc:Choice>
-    <mc:Fallback xmlns="">
-      <p:transition spd="med">
-        <p:fade/>
-      </p:transition>
-    </mc:Fallback>
-  </mc:AlternateContent>
+  <p:transition spd="slow">
+    <p:push dir="u"/>
+  </p:transition>
 </p:sld>
 </file>
 
@@ -12504,18 +12485,9 @@
   <p:clrMapOvr>
     <a:masterClrMapping/>
   </p:clrMapOvr>
-  <mc:AlternateContent xmlns:mc="http://schemas.openxmlformats.org/markup-compatibility/2006" xmlns:p14="http://schemas.microsoft.com/office/powerpoint/2010/main">
-    <mc:Choice Requires="p14">
-      <p:transition spd="med" p14:dur="700">
-        <p:fade/>
-      </p:transition>
-    </mc:Choice>
-    <mc:Fallback xmlns="">
-      <p:transition spd="med">
-        <p:fade/>
-      </p:transition>
-    </mc:Fallback>
-  </mc:AlternateContent>
+  <p:transition spd="med">
+    <p:pull/>
+  </p:transition>
 </p:sld>
 </file>
 
@@ -12604,18 +12576,9 @@
   <p:clrMapOvr>
     <a:masterClrMapping/>
   </p:clrMapOvr>
-  <mc:AlternateContent xmlns:mc="http://schemas.openxmlformats.org/markup-compatibility/2006" xmlns:p14="http://schemas.microsoft.com/office/powerpoint/2010/main">
-    <mc:Choice Requires="p14">
-      <p:transition spd="med" p14:dur="700">
-        <p:fade/>
-      </p:transition>
-    </mc:Choice>
-    <mc:Fallback xmlns="">
-      <p:transition spd="med">
-        <p:fade/>
-      </p:transition>
-    </mc:Fallback>
-  </mc:AlternateContent>
+  <p:transition spd="med">
+    <p:pull/>
+  </p:transition>
 </p:sld>
 </file>
 
@@ -13077,18 +13040,9 @@
   <p:clrMapOvr>
     <a:masterClrMapping/>
   </p:clrMapOvr>
-  <mc:AlternateContent xmlns:mc="http://schemas.openxmlformats.org/markup-compatibility/2006" xmlns:p14="http://schemas.microsoft.com/office/powerpoint/2010/main">
-    <mc:Choice Requires="p14">
-      <p:transition spd="med" p14:dur="700">
-        <p:fade/>
-      </p:transition>
-    </mc:Choice>
-    <mc:Fallback xmlns="">
-      <p:transition spd="med">
-        <p:fade/>
-      </p:transition>
-    </mc:Fallback>
-  </mc:AlternateContent>
+  <p:transition spd="slow">
+    <p:push dir="u"/>
+  </p:transition>
 </p:sld>
 </file>
 
@@ -13177,18 +13131,9 @@
   <p:clrMapOvr>
     <a:masterClrMapping/>
   </p:clrMapOvr>
-  <mc:AlternateContent xmlns:mc="http://schemas.openxmlformats.org/markup-compatibility/2006" xmlns:p14="http://schemas.microsoft.com/office/powerpoint/2010/main">
-    <mc:Choice Requires="p14">
-      <p:transition spd="med" p14:dur="700">
-        <p:fade/>
-      </p:transition>
-    </mc:Choice>
-    <mc:Fallback xmlns="">
-      <p:transition spd="med">
-        <p:fade/>
-      </p:transition>
-    </mc:Fallback>
-  </mc:AlternateContent>
+  <p:transition spd="med">
+    <p:pull/>
+  </p:transition>
 </p:sld>
 </file>
 
@@ -13211,50 +13156,38 @@
       </p:grpSpPr>
       <p:sp>
         <p:nvSpPr>
-          <p:cNvPr id="10" name="CaixaDeTexto 9">
+          <p:cNvPr id="2" name="Título 1">
             <a:extLst>
               <a:ext uri="{FF2B5EF4-FFF2-40B4-BE49-F238E27FC236}">
-                <a16:creationId xmlns:a16="http://schemas.microsoft.com/office/drawing/2014/main" id="{B45E979A-D00E-4EF5-9CED-43A8CEE5F3E6}"/>
+                <a16:creationId xmlns:a16="http://schemas.microsoft.com/office/drawing/2014/main" id="{0009F1CF-8171-46C5-90DA-3BAD2DA55A53}"/>
               </a:ext>
             </a:extLst>
           </p:cNvPr>
-          <p:cNvSpPr txBox="1"/>
-          <p:nvPr/>
-        </p:nvSpPr>
-        <p:spPr>
-          <a:xfrm>
-            <a:off x="1795369" y="403388"/>
-            <a:ext cx="6341013" cy="707886"/>
-          </a:xfrm>
-          <a:prstGeom prst="rect">
-            <a:avLst/>
-          </a:prstGeom>
-          <a:noFill/>
-        </p:spPr>
-        <p:txBody>
-          <a:bodyPr wrap="square" rtlCol="0">
-            <a:spAutoFit/>
-          </a:bodyPr>
+          <p:cNvSpPr>
+            <a:spLocks noGrp="1"/>
+          </p:cNvSpPr>
+          <p:nvPr>
+            <p:ph type="title"/>
+          </p:nvPr>
+        </p:nvSpPr>
+        <p:spPr/>
+        <p:txBody>
+          <a:bodyPr/>
           <a:lstStyle/>
           <a:p>
             <a:r>
-              <a:rPr lang="pt-BR" sz="4000" dirty="0">
-                <a:solidFill>
-                  <a:schemeClr val="bg1"/>
-                </a:solidFill>
-                <a:latin typeface="+mj-lt"/>
-              </a:rPr>
-              <a:t>Cenário de Teste</a:t>
+              <a:rPr lang="pt-BR" dirty="0"/>
+              <a:t>Cenários de testes </a:t>
             </a:r>
           </a:p>
         </p:txBody>
       </p:sp>
       <p:pic>
         <p:nvPicPr>
-          <p:cNvPr id="2" name="Picture 1">
+          <p:cNvPr id="3" name="Imagem 2">
             <a:extLst>
               <a:ext uri="{FF2B5EF4-FFF2-40B4-BE49-F238E27FC236}">
-                <a16:creationId xmlns:a16="http://schemas.microsoft.com/office/drawing/2014/main" id="{1E674C97-315D-49EB-AFC2-21266203B1B6}"/>
+                <a16:creationId xmlns:a16="http://schemas.microsoft.com/office/drawing/2014/main" id="{C91481C1-C620-4E03-BCF6-1B58CF63C3B1}"/>
               </a:ext>
             </a:extLst>
           </p:cNvPr>
@@ -13271,8 +13204,8 @@
         </p:blipFill>
         <p:spPr>
           <a:xfrm>
-            <a:off x="0" y="1654012"/>
-            <a:ext cx="12196118" cy="4800600"/>
+            <a:off x="0" y="2100455"/>
+            <a:ext cx="12192000" cy="4228714"/>
           </a:xfrm>
           <a:prstGeom prst="rect">
             <a:avLst/>
@@ -13282,25 +13215,16 @@
     </p:spTree>
     <p:extLst>
       <p:ext uri="{BB962C8B-B14F-4D97-AF65-F5344CB8AC3E}">
-        <p14:creationId xmlns:p14="http://schemas.microsoft.com/office/powerpoint/2010/main" val="4177483818"/>
+        <p14:creationId xmlns:p14="http://schemas.microsoft.com/office/powerpoint/2010/main" val="1756077762"/>
       </p:ext>
     </p:extLst>
   </p:cSld>
   <p:clrMapOvr>
     <a:masterClrMapping/>
   </p:clrMapOvr>
-  <mc:AlternateContent xmlns:mc="http://schemas.openxmlformats.org/markup-compatibility/2006" xmlns:p14="http://schemas.microsoft.com/office/powerpoint/2010/main">
-    <mc:Choice Requires="p14">
-      <p:transition spd="med" p14:dur="700">
-        <p:fade/>
-      </p:transition>
-    </mc:Choice>
-    <mc:Fallback xmlns="">
-      <p:transition spd="med">
-        <p:fade/>
-      </p:transition>
-    </mc:Fallback>
-  </mc:AlternateContent>
+  <p:transition spd="med">
+    <p:pull/>
+  </p:transition>
 </p:sld>
 </file>
 
@@ -13389,18 +13313,9 @@
   <p:clrMapOvr>
     <a:masterClrMapping/>
   </p:clrMapOvr>
-  <mc:AlternateContent xmlns:mc="http://schemas.openxmlformats.org/markup-compatibility/2006" xmlns:p14="http://schemas.microsoft.com/office/powerpoint/2010/main">
-    <mc:Choice Requires="p14">
-      <p:transition spd="med" p14:dur="700">
-        <p:fade/>
-      </p:transition>
-    </mc:Choice>
-    <mc:Fallback xmlns="">
-      <p:transition spd="med">
-        <p:fade/>
-      </p:transition>
-    </mc:Fallback>
-  </mc:AlternateContent>
+  <p:transition spd="med">
+    <p:pull/>
+  </p:transition>
 </p:sld>
 </file>
 
@@ -14634,18 +14549,9 @@
   <p:clrMapOvr>
     <a:masterClrMapping/>
   </p:clrMapOvr>
-  <mc:AlternateContent xmlns:mc="http://schemas.openxmlformats.org/markup-compatibility/2006" xmlns:p14="http://schemas.microsoft.com/office/powerpoint/2010/main">
-    <mc:Choice Requires="p14">
-      <p:transition spd="med" p14:dur="700">
-        <p:fade/>
-      </p:transition>
-    </mc:Choice>
-    <mc:Fallback xmlns="">
-      <p:transition spd="med">
-        <p:fade/>
-      </p:transition>
-    </mc:Fallback>
-  </mc:AlternateContent>
+  <p:transition spd="slow">
+    <p:push dir="u"/>
+  </p:transition>
   <p:timing>
     <p:tnLst>
       <p:par>
@@ -15611,18 +15517,9 @@
   <p:clrMapOvr>
     <a:masterClrMapping/>
   </p:clrMapOvr>
-  <mc:AlternateContent xmlns:mc="http://schemas.openxmlformats.org/markup-compatibility/2006" xmlns:p14="http://schemas.microsoft.com/office/powerpoint/2010/main">
-    <mc:Choice Requires="p14">
-      <p:transition spd="med" p14:dur="700">
-        <p:fade/>
-      </p:transition>
-    </mc:Choice>
-    <mc:Fallback xmlns="">
-      <p:transition spd="med">
-        <p:fade/>
-      </p:transition>
-    </mc:Fallback>
-  </mc:AlternateContent>
+  <p:transition spd="med">
+    <p:pull/>
+  </p:transition>
   <p:timing>
     <p:tnLst>
       <p:par>
@@ -15802,17 +15699,17 @@
           <a:p>
             <a:r>
               <a:rPr lang="pt-BR" dirty="0"/>
-              <a:t>N1</a:t>
+              <a:t>Processo de Atendimento</a:t>
             </a:r>
           </a:p>
         </p:txBody>
       </p:sp>
       <p:pic>
         <p:nvPicPr>
-          <p:cNvPr id="42" name="Imagem 41">
+          <p:cNvPr id="6" name="Imagem 5">
             <a:extLst>
               <a:ext uri="{FF2B5EF4-FFF2-40B4-BE49-F238E27FC236}">
-                <a16:creationId xmlns:a16="http://schemas.microsoft.com/office/drawing/2014/main" id="{595768CC-15C5-434E-B9BF-09EE281217FA}"/>
+                <a16:creationId xmlns:a16="http://schemas.microsoft.com/office/drawing/2014/main" id="{340F95F2-2F92-4E98-ADFB-F91810DDB380}"/>
               </a:ext>
             </a:extLst>
           </p:cNvPr>
@@ -15821,1177 +15718,34 @@
           </p:cNvPicPr>
           <p:nvPr/>
         </p:nvPicPr>
-        <p:blipFill>
+        <p:blipFill rotWithShape="1">
           <a:blip r:embed="rId2"/>
-          <a:stretch>
-            <a:fillRect/>
-          </a:stretch>
+          <a:srcRect r="66133"/>
+          <a:stretch/>
         </p:blipFill>
         <p:spPr>
           <a:xfrm>
-            <a:off x="138958" y="6035400"/>
-            <a:ext cx="2312884" cy="482321"/>
-          </a:xfrm>
-          <a:prstGeom prst="rect">
-            <a:avLst/>
-          </a:prstGeom>
-          <a:ln>
-            <a:noFill/>
-          </a:ln>
+            <a:off x="2087132" y="1862697"/>
+            <a:ext cx="8017736" cy="4640155"/>
+          </a:xfrm>
+          <a:prstGeom prst="rect">
+            <a:avLst/>
+          </a:prstGeom>
         </p:spPr>
       </p:pic>
-      <p:sp>
-        <p:nvSpPr>
-          <p:cNvPr id="43" name="Retângulo Arredondado 2">
-            <a:extLst>
-              <a:ext uri="{FF2B5EF4-FFF2-40B4-BE49-F238E27FC236}">
-                <a16:creationId xmlns:a16="http://schemas.microsoft.com/office/drawing/2014/main" id="{D39010F4-D6F6-4DFA-96D0-ED9933ADFEC7}"/>
-              </a:ext>
-            </a:extLst>
-          </p:cNvPr>
-          <p:cNvSpPr/>
-          <p:nvPr/>
-        </p:nvSpPr>
-        <p:spPr>
-          <a:xfrm>
-            <a:off x="1781778" y="1743335"/>
-            <a:ext cx="1982978" cy="1282890"/>
-          </a:xfrm>
-          <a:prstGeom prst="roundRect">
-            <a:avLst/>
-          </a:prstGeom>
-          <a:ln>
-            <a:solidFill>
-              <a:schemeClr val="accent1">
-                <a:lumMod val="50000"/>
-              </a:schemeClr>
-            </a:solidFill>
-          </a:ln>
-        </p:spPr>
-        <p:style>
-          <a:lnRef idx="2">
-            <a:schemeClr val="accent6"/>
-          </a:lnRef>
-          <a:fillRef idx="1">
-            <a:schemeClr val="lt1"/>
-          </a:fillRef>
-          <a:effectRef idx="0">
-            <a:schemeClr val="accent6"/>
-          </a:effectRef>
-          <a:fontRef idx="minor">
-            <a:schemeClr val="dk1"/>
-          </a:fontRef>
-        </p:style>
-        <p:txBody>
-          <a:bodyPr rtlCol="0" anchor="ctr"/>
-          <a:lstStyle/>
-          <a:p>
-            <a:pPr algn="ctr"/>
-            <a:r>
-              <a:rPr lang="pt-BR" dirty="0"/>
-              <a:t>Informar o erro ao atendimento (N1).</a:t>
-            </a:r>
-          </a:p>
-        </p:txBody>
-      </p:sp>
-      <p:sp>
-        <p:nvSpPr>
-          <p:cNvPr id="44" name="Retângulo Arredondado 6">
-            <a:extLst>
-              <a:ext uri="{FF2B5EF4-FFF2-40B4-BE49-F238E27FC236}">
-                <a16:creationId xmlns:a16="http://schemas.microsoft.com/office/drawing/2014/main" id="{59594901-7B8A-4038-873A-DBAA88953C72}"/>
-              </a:ext>
-            </a:extLst>
-          </p:cNvPr>
-          <p:cNvSpPr/>
-          <p:nvPr/>
-        </p:nvSpPr>
-        <p:spPr>
-          <a:xfrm>
-            <a:off x="1724409" y="3929067"/>
-            <a:ext cx="2088108" cy="1282890"/>
-          </a:xfrm>
-          <a:prstGeom prst="roundRect">
-            <a:avLst/>
-          </a:prstGeom>
-          <a:ln>
-            <a:solidFill>
-              <a:schemeClr val="accent1">
-                <a:lumMod val="50000"/>
-              </a:schemeClr>
-            </a:solidFill>
-          </a:ln>
-        </p:spPr>
-        <p:style>
-          <a:lnRef idx="2">
-            <a:schemeClr val="accent6"/>
-          </a:lnRef>
-          <a:fillRef idx="1">
-            <a:schemeClr val="lt1"/>
-          </a:fillRef>
-          <a:effectRef idx="0">
-            <a:schemeClr val="accent6"/>
-          </a:effectRef>
-          <a:fontRef idx="minor">
-            <a:schemeClr val="dk1"/>
-          </a:fontRef>
-        </p:style>
-        <p:txBody>
-          <a:bodyPr rtlCol="0" anchor="ctr"/>
-          <a:lstStyle/>
-          <a:p>
-            <a:pPr algn="ctr"/>
-            <a:r>
-              <a:rPr lang="pt-BR" dirty="0"/>
-              <a:t>Verificar se o problema está na base de erros conhecidos/FAQ</a:t>
-            </a:r>
-          </a:p>
-        </p:txBody>
-      </p:sp>
-      <p:cxnSp>
-        <p:nvCxnSpPr>
-          <p:cNvPr id="45" name="Conector reto 44">
-            <a:extLst>
-              <a:ext uri="{FF2B5EF4-FFF2-40B4-BE49-F238E27FC236}">
-                <a16:creationId xmlns:a16="http://schemas.microsoft.com/office/drawing/2014/main" id="{8578F7A8-9FD3-40E4-9223-29EC3D224D57}"/>
-              </a:ext>
-            </a:extLst>
-          </p:cNvPr>
-          <p:cNvCxnSpPr>
-            <a:cxnSpLocks/>
-            <a:stCxn id="43" idx="2"/>
-            <a:endCxn id="44" idx="0"/>
-          </p:cNvCxnSpPr>
-          <p:nvPr/>
-        </p:nvCxnSpPr>
-        <p:spPr>
-          <a:xfrm flipH="1">
-            <a:off x="2768463" y="3026225"/>
-            <a:ext cx="4804" cy="902842"/>
-          </a:xfrm>
-          <a:prstGeom prst="line">
-            <a:avLst/>
-          </a:prstGeom>
-          <a:ln>
-            <a:solidFill>
-              <a:schemeClr val="accent1">
-                <a:lumMod val="50000"/>
-              </a:schemeClr>
-            </a:solidFill>
-          </a:ln>
-        </p:spPr>
-        <p:style>
-          <a:lnRef idx="1">
-            <a:schemeClr val="accent6"/>
-          </a:lnRef>
-          <a:fillRef idx="0">
-            <a:schemeClr val="accent6"/>
-          </a:fillRef>
-          <a:effectRef idx="0">
-            <a:schemeClr val="accent6"/>
-          </a:effectRef>
-          <a:fontRef idx="minor">
-            <a:schemeClr val="tx1"/>
-          </a:fontRef>
-        </p:style>
-      </p:cxnSp>
-      <p:sp>
-        <p:nvSpPr>
-          <p:cNvPr id="46" name="Retângulo Arredondado 12">
-            <a:extLst>
-              <a:ext uri="{FF2B5EF4-FFF2-40B4-BE49-F238E27FC236}">
-                <a16:creationId xmlns:a16="http://schemas.microsoft.com/office/drawing/2014/main" id="{0CB4AD69-6B74-4A9A-A2C0-6F25BD3DC681}"/>
-              </a:ext>
-            </a:extLst>
-          </p:cNvPr>
-          <p:cNvSpPr/>
-          <p:nvPr/>
-        </p:nvSpPr>
-        <p:spPr>
-          <a:xfrm>
-            <a:off x="6138755" y="1594193"/>
-            <a:ext cx="1524206" cy="987188"/>
-          </a:xfrm>
-          <a:prstGeom prst="roundRect">
-            <a:avLst/>
-          </a:prstGeom>
-          <a:ln>
-            <a:solidFill>
-              <a:schemeClr val="accent1">
-                <a:lumMod val="50000"/>
-              </a:schemeClr>
-            </a:solidFill>
-          </a:ln>
-        </p:spPr>
-        <p:style>
-          <a:lnRef idx="2">
-            <a:schemeClr val="accent6"/>
-          </a:lnRef>
-          <a:fillRef idx="1">
-            <a:schemeClr val="lt1"/>
-          </a:fillRef>
-          <a:effectRef idx="0">
-            <a:schemeClr val="accent6"/>
-          </a:effectRef>
-          <a:fontRef idx="minor">
-            <a:schemeClr val="dk1"/>
-          </a:fontRef>
-        </p:style>
-        <p:txBody>
-          <a:bodyPr rtlCol="0" anchor="ctr"/>
-          <a:lstStyle/>
-          <a:p>
-            <a:pPr algn="ctr"/>
-            <a:r>
-              <a:rPr lang="pt-BR" sz="1600" dirty="0"/>
-              <a:t>Aplicar Solução para corrigir o problema</a:t>
-            </a:r>
-          </a:p>
-        </p:txBody>
-      </p:sp>
-      <p:sp>
-        <p:nvSpPr>
-          <p:cNvPr id="49" name="CaixaDeTexto 48">
-            <a:extLst>
-              <a:ext uri="{FF2B5EF4-FFF2-40B4-BE49-F238E27FC236}">
-                <a16:creationId xmlns:a16="http://schemas.microsoft.com/office/drawing/2014/main" id="{7265AA1E-8ACD-4180-BACF-68523D8474F3}"/>
-              </a:ext>
-            </a:extLst>
-          </p:cNvPr>
-          <p:cNvSpPr txBox="1"/>
-          <p:nvPr/>
-        </p:nvSpPr>
-        <p:spPr>
-          <a:xfrm>
-            <a:off x="8931962" y="3137128"/>
-            <a:ext cx="595565" cy="369332"/>
-          </a:xfrm>
-          <a:prstGeom prst="rect">
-            <a:avLst/>
-          </a:prstGeom>
-          <a:noFill/>
-          <a:ln>
-            <a:solidFill>
-              <a:schemeClr val="accent1">
-                <a:lumMod val="50000"/>
-              </a:schemeClr>
-            </a:solidFill>
-          </a:ln>
-        </p:spPr>
-        <p:txBody>
-          <a:bodyPr wrap="square" rtlCol="0">
-            <a:spAutoFit/>
-          </a:bodyPr>
-          <a:lstStyle/>
-          <a:p>
-            <a:r>
-              <a:rPr lang="pt-BR" dirty="0"/>
-              <a:t>Não</a:t>
-            </a:r>
-          </a:p>
-        </p:txBody>
-      </p:sp>
-      <p:cxnSp>
-        <p:nvCxnSpPr>
-          <p:cNvPr id="50" name="Conector reto 49">
-            <a:extLst>
-              <a:ext uri="{FF2B5EF4-FFF2-40B4-BE49-F238E27FC236}">
-                <a16:creationId xmlns:a16="http://schemas.microsoft.com/office/drawing/2014/main" id="{A198F596-D52B-4B78-A8BC-AA6CBF33CF91}"/>
-              </a:ext>
-            </a:extLst>
-          </p:cNvPr>
-          <p:cNvCxnSpPr>
-            <a:cxnSpLocks/>
-          </p:cNvCxnSpPr>
-          <p:nvPr/>
-        </p:nvCxnSpPr>
-        <p:spPr>
-          <a:xfrm>
-            <a:off x="9270816" y="3717153"/>
-            <a:ext cx="17842" cy="0"/>
-          </a:xfrm>
-          <a:prstGeom prst="line">
-            <a:avLst/>
-          </a:prstGeom>
-          <a:ln>
-            <a:solidFill>
-              <a:schemeClr val="accent1">
-                <a:lumMod val="50000"/>
-              </a:schemeClr>
-            </a:solidFill>
-          </a:ln>
-        </p:spPr>
-        <p:style>
-          <a:lnRef idx="1">
-            <a:schemeClr val="accent6"/>
-          </a:lnRef>
-          <a:fillRef idx="0">
-            <a:schemeClr val="accent6"/>
-          </a:fillRef>
-          <a:effectRef idx="0">
-            <a:schemeClr val="accent6"/>
-          </a:effectRef>
-          <a:fontRef idx="minor">
-            <a:schemeClr val="tx1"/>
-          </a:fontRef>
-        </p:style>
-      </p:cxnSp>
-      <p:sp>
-        <p:nvSpPr>
-          <p:cNvPr id="51" name="Retângulo Arredondado 34">
-            <a:extLst>
-              <a:ext uri="{FF2B5EF4-FFF2-40B4-BE49-F238E27FC236}">
-                <a16:creationId xmlns:a16="http://schemas.microsoft.com/office/drawing/2014/main" id="{D5E7B47A-7C48-4653-9125-D5D24164790E}"/>
-              </a:ext>
-            </a:extLst>
-          </p:cNvPr>
-          <p:cNvSpPr/>
-          <p:nvPr/>
-        </p:nvSpPr>
-        <p:spPr>
-          <a:xfrm>
-            <a:off x="4351564" y="5508229"/>
-            <a:ext cx="1787191" cy="768331"/>
-          </a:xfrm>
-          <a:prstGeom prst="roundRect">
-            <a:avLst/>
-          </a:prstGeom>
-          <a:ln>
-            <a:solidFill>
-              <a:schemeClr val="accent1">
-                <a:lumMod val="50000"/>
-              </a:schemeClr>
-            </a:solidFill>
-          </a:ln>
-        </p:spPr>
-        <p:style>
-          <a:lnRef idx="2">
-            <a:schemeClr val="accent6"/>
-          </a:lnRef>
-          <a:fillRef idx="1">
-            <a:schemeClr val="lt1"/>
-          </a:fillRef>
-          <a:effectRef idx="0">
-            <a:schemeClr val="accent6"/>
-          </a:effectRef>
-          <a:fontRef idx="minor">
-            <a:schemeClr val="dk1"/>
-          </a:fontRef>
-        </p:style>
-        <p:txBody>
-          <a:bodyPr rtlCol="0" anchor="ctr"/>
-          <a:lstStyle/>
-          <a:p>
-            <a:pPr algn="ctr"/>
-            <a:r>
-              <a:rPr lang="pt-BR" dirty="0"/>
-              <a:t>Transferir chamado ao Suporte(N2)</a:t>
-            </a:r>
-          </a:p>
-        </p:txBody>
-      </p:sp>
-      <p:sp>
-        <p:nvSpPr>
-          <p:cNvPr id="52" name="Retângulo Arredondado 35">
-            <a:extLst>
-              <a:ext uri="{FF2B5EF4-FFF2-40B4-BE49-F238E27FC236}">
-                <a16:creationId xmlns:a16="http://schemas.microsoft.com/office/drawing/2014/main" id="{512B9652-C6A4-4FA4-9E71-8700962F6D75}"/>
-              </a:ext>
-            </a:extLst>
-          </p:cNvPr>
-          <p:cNvSpPr/>
-          <p:nvPr/>
-        </p:nvSpPr>
-        <p:spPr>
-          <a:xfrm>
-            <a:off x="9802171" y="3929067"/>
-            <a:ext cx="2196477" cy="1282890"/>
-          </a:xfrm>
-          <a:prstGeom prst="roundRect">
-            <a:avLst/>
-          </a:prstGeom>
-          <a:ln>
-            <a:solidFill>
-              <a:schemeClr val="accent1">
-                <a:lumMod val="50000"/>
-              </a:schemeClr>
-            </a:solidFill>
-          </a:ln>
-        </p:spPr>
-        <p:style>
-          <a:lnRef idx="2">
-            <a:schemeClr val="accent6"/>
-          </a:lnRef>
-          <a:fillRef idx="1">
-            <a:schemeClr val="lt1"/>
-          </a:fillRef>
-          <a:effectRef idx="0">
-            <a:schemeClr val="accent6"/>
-          </a:effectRef>
-          <a:fontRef idx="minor">
-            <a:schemeClr val="dk1"/>
-          </a:fontRef>
-        </p:style>
-        <p:txBody>
-          <a:bodyPr rtlCol="0" anchor="ctr"/>
-          <a:lstStyle/>
-          <a:p>
-            <a:pPr algn="ctr"/>
-            <a:r>
-              <a:rPr lang="pt-BR" dirty="0"/>
-              <a:t>Informa o ocorrido/solução aplicada e finalizar o chamado.</a:t>
-            </a:r>
-          </a:p>
-        </p:txBody>
-      </p:sp>
-      <p:sp>
-        <p:nvSpPr>
-          <p:cNvPr id="53" name="CaixaDeTexto 52">
-            <a:extLst>
-              <a:ext uri="{FF2B5EF4-FFF2-40B4-BE49-F238E27FC236}">
-                <a16:creationId xmlns:a16="http://schemas.microsoft.com/office/drawing/2014/main" id="{779A2501-FA6C-4AAE-91B2-20E7E72F67FF}"/>
-              </a:ext>
-            </a:extLst>
-          </p:cNvPr>
-          <p:cNvSpPr txBox="1"/>
-          <p:nvPr/>
-        </p:nvSpPr>
-        <p:spPr>
-          <a:xfrm>
-            <a:off x="10153153" y="1816898"/>
-            <a:ext cx="555096" cy="369332"/>
-          </a:xfrm>
-          <a:prstGeom prst="rect">
-            <a:avLst/>
-          </a:prstGeom>
-          <a:noFill/>
-          <a:ln>
-            <a:solidFill>
-              <a:schemeClr val="accent1">
-                <a:lumMod val="50000"/>
-              </a:schemeClr>
-            </a:solidFill>
-          </a:ln>
-        </p:spPr>
-        <p:txBody>
-          <a:bodyPr wrap="square" rtlCol="0">
-            <a:spAutoFit/>
-          </a:bodyPr>
-          <a:lstStyle/>
-          <a:p>
-            <a:r>
-              <a:rPr lang="pt-BR" dirty="0"/>
-              <a:t>Sim</a:t>
-            </a:r>
-          </a:p>
-        </p:txBody>
-      </p:sp>
-      <p:sp>
-        <p:nvSpPr>
-          <p:cNvPr id="54" name="Elipse 53">
-            <a:extLst>
-              <a:ext uri="{FF2B5EF4-FFF2-40B4-BE49-F238E27FC236}">
-                <a16:creationId xmlns:a16="http://schemas.microsoft.com/office/drawing/2014/main" id="{0CA682AF-1A1E-4D0A-B2CE-1C0F8DDCA16A}"/>
-              </a:ext>
-            </a:extLst>
-          </p:cNvPr>
-          <p:cNvSpPr/>
-          <p:nvPr/>
-        </p:nvSpPr>
-        <p:spPr>
-          <a:xfrm>
-            <a:off x="10430701" y="5688466"/>
-            <a:ext cx="931798" cy="914400"/>
-          </a:xfrm>
-          <a:prstGeom prst="ellipse">
-            <a:avLst/>
-          </a:prstGeom>
-          <a:ln>
-            <a:solidFill>
-              <a:schemeClr val="accent1">
-                <a:lumMod val="50000"/>
-              </a:schemeClr>
-            </a:solidFill>
-          </a:ln>
-        </p:spPr>
-        <p:style>
-          <a:lnRef idx="2">
-            <a:schemeClr val="accent3"/>
-          </a:lnRef>
-          <a:fillRef idx="1">
-            <a:schemeClr val="lt1"/>
-          </a:fillRef>
-          <a:effectRef idx="0">
-            <a:schemeClr val="accent3"/>
-          </a:effectRef>
-          <a:fontRef idx="minor">
-            <a:schemeClr val="dk1"/>
-          </a:fontRef>
-        </p:style>
-        <p:txBody>
-          <a:bodyPr rtlCol="0" anchor="ctr"/>
-          <a:lstStyle/>
-          <a:p>
-            <a:pPr algn="ctr"/>
-            <a:r>
-              <a:rPr lang="pt-BR" dirty="0">
-                <a:solidFill>
-                  <a:schemeClr val="tx1"/>
-                </a:solidFill>
-              </a:rPr>
-              <a:t>Fim</a:t>
-            </a:r>
-          </a:p>
-        </p:txBody>
-      </p:sp>
-      <p:cxnSp>
-        <p:nvCxnSpPr>
-          <p:cNvPr id="55" name="Conector reto 54">
-            <a:extLst>
-              <a:ext uri="{FF2B5EF4-FFF2-40B4-BE49-F238E27FC236}">
-                <a16:creationId xmlns:a16="http://schemas.microsoft.com/office/drawing/2014/main" id="{1D7D0F30-0223-4C54-BFF5-3D57D77CD880}"/>
-              </a:ext>
-            </a:extLst>
-          </p:cNvPr>
-          <p:cNvCxnSpPr>
-            <a:cxnSpLocks/>
-            <a:stCxn id="52" idx="2"/>
-            <a:endCxn id="54" idx="0"/>
-          </p:cNvCxnSpPr>
-          <p:nvPr/>
-        </p:nvCxnSpPr>
-        <p:spPr>
-          <a:xfrm flipH="1">
-            <a:off x="10896600" y="5211957"/>
-            <a:ext cx="3810" cy="476509"/>
-          </a:xfrm>
-          <a:prstGeom prst="line">
-            <a:avLst/>
-          </a:prstGeom>
-          <a:ln>
-            <a:solidFill>
-              <a:schemeClr val="accent1">
-                <a:lumMod val="50000"/>
-              </a:schemeClr>
-            </a:solidFill>
-          </a:ln>
-        </p:spPr>
-        <p:style>
-          <a:lnRef idx="1">
-            <a:schemeClr val="accent2"/>
-          </a:lnRef>
-          <a:fillRef idx="0">
-            <a:schemeClr val="accent2"/>
-          </a:fillRef>
-          <a:effectRef idx="0">
-            <a:schemeClr val="accent2"/>
-          </a:effectRef>
-          <a:fontRef idx="minor">
-            <a:schemeClr val="tx1"/>
-          </a:fontRef>
-        </p:style>
-      </p:cxnSp>
-      <p:cxnSp>
-        <p:nvCxnSpPr>
-          <p:cNvPr id="58" name="Conector: Angulado 57">
-            <a:extLst>
-              <a:ext uri="{FF2B5EF4-FFF2-40B4-BE49-F238E27FC236}">
-                <a16:creationId xmlns:a16="http://schemas.microsoft.com/office/drawing/2014/main" id="{ABC60527-19FB-4018-89AE-3C1EF5F1885F}"/>
-              </a:ext>
-            </a:extLst>
-          </p:cNvPr>
-          <p:cNvCxnSpPr>
-            <a:cxnSpLocks/>
-          </p:cNvCxnSpPr>
-          <p:nvPr/>
-        </p:nvCxnSpPr>
-        <p:spPr>
-          <a:xfrm>
-            <a:off x="7662961" y="1973127"/>
-            <a:ext cx="1340571" cy="203073"/>
-          </a:xfrm>
-          <a:prstGeom prst="bentConnector3">
-            <a:avLst>
-              <a:gd name="adj1" fmla="val 50000"/>
-            </a:avLst>
-          </a:prstGeom>
-          <a:ln>
-            <a:solidFill>
-              <a:schemeClr val="accent1">
-                <a:lumMod val="50000"/>
-              </a:schemeClr>
-            </a:solidFill>
-          </a:ln>
-        </p:spPr>
-        <p:style>
-          <a:lnRef idx="1">
-            <a:schemeClr val="accent1"/>
-          </a:lnRef>
-          <a:fillRef idx="0">
-            <a:schemeClr val="accent1"/>
-          </a:fillRef>
-          <a:effectRef idx="0">
-            <a:schemeClr val="accent1"/>
-          </a:effectRef>
-          <a:fontRef idx="minor">
-            <a:schemeClr val="tx1"/>
-          </a:fontRef>
-        </p:style>
-      </p:cxnSp>
-      <p:sp>
-        <p:nvSpPr>
-          <p:cNvPr id="59" name="Elipse 58">
-            <a:extLst>
-              <a:ext uri="{FF2B5EF4-FFF2-40B4-BE49-F238E27FC236}">
-                <a16:creationId xmlns:a16="http://schemas.microsoft.com/office/drawing/2014/main" id="{5B1E7813-DCBB-46D7-AD44-E1E2EB5DB28C}"/>
-              </a:ext>
-            </a:extLst>
-          </p:cNvPr>
-          <p:cNvSpPr/>
-          <p:nvPr/>
-        </p:nvSpPr>
-        <p:spPr>
-          <a:xfrm flipH="1">
-            <a:off x="151227" y="1842868"/>
-            <a:ext cx="1002323" cy="858129"/>
-          </a:xfrm>
-          <a:prstGeom prst="ellipse">
-            <a:avLst/>
-          </a:prstGeom>
-          <a:solidFill>
-            <a:schemeClr val="bg1"/>
-          </a:solidFill>
-          <a:ln>
-            <a:solidFill>
-              <a:schemeClr val="accent1">
-                <a:lumMod val="50000"/>
-              </a:schemeClr>
-            </a:solidFill>
-          </a:ln>
-        </p:spPr>
-        <p:style>
-          <a:lnRef idx="2">
-            <a:schemeClr val="accent1">
-              <a:shade val="50000"/>
-            </a:schemeClr>
-          </a:lnRef>
-          <a:fillRef idx="1">
-            <a:schemeClr val="accent1"/>
-          </a:fillRef>
-          <a:effectRef idx="0">
-            <a:schemeClr val="accent1"/>
-          </a:effectRef>
-          <a:fontRef idx="minor">
-            <a:schemeClr val="lt1"/>
-          </a:fontRef>
-        </p:style>
-        <p:txBody>
-          <a:bodyPr rtlCol="0" anchor="ctr"/>
-          <a:lstStyle/>
-          <a:p>
-            <a:pPr algn="ctr"/>
-            <a:r>
-              <a:rPr lang="pt-BR" dirty="0">
-                <a:solidFill>
-                  <a:schemeClr val="tx1"/>
-                </a:solidFill>
-              </a:rPr>
-              <a:t>Início</a:t>
-            </a:r>
-            <a:endParaRPr lang="pt-BR" dirty="0"/>
-          </a:p>
-        </p:txBody>
-      </p:sp>
-      <p:cxnSp>
-        <p:nvCxnSpPr>
-          <p:cNvPr id="64" name="Conector reto 63">
-            <a:extLst>
-              <a:ext uri="{FF2B5EF4-FFF2-40B4-BE49-F238E27FC236}">
-                <a16:creationId xmlns:a16="http://schemas.microsoft.com/office/drawing/2014/main" id="{DA8F4A69-9027-4C21-B0D2-D627D07FA2EA}"/>
-              </a:ext>
-            </a:extLst>
-          </p:cNvPr>
-          <p:cNvCxnSpPr>
-            <a:cxnSpLocks/>
-            <a:stCxn id="59" idx="2"/>
-          </p:cNvCxnSpPr>
-          <p:nvPr/>
-        </p:nvCxnSpPr>
-        <p:spPr>
-          <a:xfrm>
-            <a:off x="1153550" y="2271933"/>
-            <a:ext cx="628228" cy="0"/>
-          </a:xfrm>
-          <a:prstGeom prst="line">
-            <a:avLst/>
-          </a:prstGeom>
-          <a:ln>
-            <a:solidFill>
-              <a:schemeClr val="accent1">
-                <a:lumMod val="50000"/>
-              </a:schemeClr>
-            </a:solidFill>
-          </a:ln>
-        </p:spPr>
-        <p:style>
-          <a:lnRef idx="1">
-            <a:schemeClr val="accent1"/>
-          </a:lnRef>
-          <a:fillRef idx="0">
-            <a:schemeClr val="accent1"/>
-          </a:fillRef>
-          <a:effectRef idx="0">
-            <a:schemeClr val="accent1"/>
-          </a:effectRef>
-          <a:fontRef idx="minor">
-            <a:schemeClr val="tx1"/>
-          </a:fontRef>
-        </p:style>
-      </p:cxnSp>
-      <p:sp>
-        <p:nvSpPr>
-          <p:cNvPr id="75" name="Losango 74">
-            <a:extLst>
-              <a:ext uri="{FF2B5EF4-FFF2-40B4-BE49-F238E27FC236}">
-                <a16:creationId xmlns:a16="http://schemas.microsoft.com/office/drawing/2014/main" id="{559D7903-61EE-4F99-9985-EBEEAEFE6ED0}"/>
-              </a:ext>
-            </a:extLst>
-          </p:cNvPr>
-          <p:cNvSpPr/>
-          <p:nvPr/>
-        </p:nvSpPr>
-        <p:spPr>
-          <a:xfrm>
-            <a:off x="4591852" y="3207374"/>
-            <a:ext cx="1047990" cy="987189"/>
-          </a:xfrm>
-          <a:prstGeom prst="diamond">
-            <a:avLst/>
-          </a:prstGeom>
-          <a:ln>
-            <a:solidFill>
-              <a:schemeClr val="accent1">
-                <a:lumMod val="50000"/>
-              </a:schemeClr>
-            </a:solidFill>
-          </a:ln>
-        </p:spPr>
-        <p:style>
-          <a:lnRef idx="0">
-            <a:schemeClr val="accent1"/>
-          </a:lnRef>
-          <a:fillRef idx="3">
-            <a:schemeClr val="accent1"/>
-          </a:fillRef>
-          <a:effectRef idx="3">
-            <a:schemeClr val="accent1"/>
-          </a:effectRef>
-          <a:fontRef idx="minor">
-            <a:schemeClr val="lt1"/>
-          </a:fontRef>
-        </p:style>
-        <p:txBody>
-          <a:bodyPr rtlCol="0" anchor="ctr"/>
-          <a:lstStyle/>
-          <a:p>
-            <a:pPr algn="ctr"/>
-            <a:endParaRPr lang="pt-BR"/>
-          </a:p>
-        </p:txBody>
-      </p:sp>
-      <p:cxnSp>
-        <p:nvCxnSpPr>
-          <p:cNvPr id="80" name="Conector: Angulado 79">
-            <a:extLst>
-              <a:ext uri="{FF2B5EF4-FFF2-40B4-BE49-F238E27FC236}">
-                <a16:creationId xmlns:a16="http://schemas.microsoft.com/office/drawing/2014/main" id="{6C36FC4A-9D28-4DF5-8E4B-E96662D9A2C8}"/>
-              </a:ext>
-            </a:extLst>
-          </p:cNvPr>
-          <p:cNvCxnSpPr>
-            <a:cxnSpLocks/>
-            <a:stCxn id="46" idx="1"/>
-            <a:endCxn id="75" idx="0"/>
-          </p:cNvCxnSpPr>
-          <p:nvPr/>
-        </p:nvCxnSpPr>
-        <p:spPr>
-          <a:xfrm rot="10800000" flipV="1">
-            <a:off x="5115847" y="2087786"/>
-            <a:ext cx="1022908" cy="1119587"/>
-          </a:xfrm>
-          <a:prstGeom prst="bentConnector2">
-            <a:avLst/>
-          </a:prstGeom>
-          <a:ln>
-            <a:solidFill>
-              <a:schemeClr val="accent1">
-                <a:lumMod val="50000"/>
-              </a:schemeClr>
-            </a:solidFill>
-          </a:ln>
-        </p:spPr>
-        <p:style>
-          <a:lnRef idx="1">
-            <a:schemeClr val="accent1"/>
-          </a:lnRef>
-          <a:fillRef idx="0">
-            <a:schemeClr val="accent1"/>
-          </a:fillRef>
-          <a:effectRef idx="0">
-            <a:schemeClr val="accent1"/>
-          </a:effectRef>
-          <a:fontRef idx="minor">
-            <a:schemeClr val="tx1"/>
-          </a:fontRef>
-        </p:style>
-      </p:cxnSp>
-      <p:sp>
-        <p:nvSpPr>
-          <p:cNvPr id="83" name="CaixaDeTexto 82">
-            <a:extLst>
-              <a:ext uri="{FF2B5EF4-FFF2-40B4-BE49-F238E27FC236}">
-                <a16:creationId xmlns:a16="http://schemas.microsoft.com/office/drawing/2014/main" id="{C8FCF459-DF43-49B2-AC46-C1886D221CF4}"/>
-              </a:ext>
-            </a:extLst>
-          </p:cNvPr>
-          <p:cNvSpPr txBox="1"/>
-          <p:nvPr/>
-        </p:nvSpPr>
-        <p:spPr>
-          <a:xfrm>
-            <a:off x="5181594" y="1709042"/>
-            <a:ext cx="555096" cy="369332"/>
-          </a:xfrm>
-          <a:prstGeom prst="rect">
-            <a:avLst/>
-          </a:prstGeom>
-          <a:noFill/>
-          <a:ln>
-            <a:solidFill>
-              <a:schemeClr val="accent1">
-                <a:lumMod val="50000"/>
-              </a:schemeClr>
-            </a:solidFill>
-          </a:ln>
-        </p:spPr>
-        <p:txBody>
-          <a:bodyPr wrap="square" rtlCol="0">
-            <a:spAutoFit/>
-          </a:bodyPr>
-          <a:lstStyle/>
-          <a:p>
-            <a:r>
-              <a:rPr lang="pt-BR" dirty="0"/>
-              <a:t>Sim</a:t>
-            </a:r>
-          </a:p>
-        </p:txBody>
-      </p:sp>
-      <p:cxnSp>
-        <p:nvCxnSpPr>
-          <p:cNvPr id="86" name="Conector: Angulado 85">
-            <a:extLst>
-              <a:ext uri="{FF2B5EF4-FFF2-40B4-BE49-F238E27FC236}">
-                <a16:creationId xmlns:a16="http://schemas.microsoft.com/office/drawing/2014/main" id="{81412887-8C83-481F-B0E3-C0322939A048}"/>
-              </a:ext>
-            </a:extLst>
-          </p:cNvPr>
-          <p:cNvCxnSpPr>
-            <a:cxnSpLocks/>
-            <a:stCxn id="75" idx="1"/>
-            <a:endCxn id="44" idx="3"/>
-          </p:cNvCxnSpPr>
-          <p:nvPr/>
-        </p:nvCxnSpPr>
-        <p:spPr>
-          <a:xfrm rot="10800000" flipV="1">
-            <a:off x="3812518" y="3700968"/>
-            <a:ext cx="779335" cy="869543"/>
-          </a:xfrm>
-          <a:prstGeom prst="bentConnector3">
-            <a:avLst>
-              <a:gd name="adj1" fmla="val 50000"/>
-            </a:avLst>
-          </a:prstGeom>
-          <a:ln>
-            <a:solidFill>
-              <a:schemeClr val="accent1">
-                <a:lumMod val="50000"/>
-              </a:schemeClr>
-            </a:solidFill>
-          </a:ln>
-        </p:spPr>
-        <p:style>
-          <a:lnRef idx="1">
-            <a:schemeClr val="accent1"/>
-          </a:lnRef>
-          <a:fillRef idx="0">
-            <a:schemeClr val="accent1"/>
-          </a:fillRef>
-          <a:effectRef idx="0">
-            <a:schemeClr val="accent1"/>
-          </a:effectRef>
-          <a:fontRef idx="minor">
-            <a:schemeClr val="tx1"/>
-          </a:fontRef>
-        </p:style>
-      </p:cxnSp>
-      <p:cxnSp>
-        <p:nvCxnSpPr>
-          <p:cNvPr id="94" name="Conector: Angulado 93">
-            <a:extLst>
-              <a:ext uri="{FF2B5EF4-FFF2-40B4-BE49-F238E27FC236}">
-                <a16:creationId xmlns:a16="http://schemas.microsoft.com/office/drawing/2014/main" id="{BBD6F50D-7387-472F-895B-5BA00AC118E4}"/>
-              </a:ext>
-            </a:extLst>
-          </p:cNvPr>
-          <p:cNvCxnSpPr>
-            <a:cxnSpLocks/>
-          </p:cNvCxnSpPr>
-          <p:nvPr/>
-        </p:nvCxnSpPr>
-        <p:spPr>
-          <a:xfrm rot="16200000" flipH="1">
-            <a:off x="4453571" y="4851396"/>
-            <a:ext cx="1313670" cy="2"/>
-          </a:xfrm>
-          <a:prstGeom prst="bentConnector3">
-            <a:avLst>
-              <a:gd name="adj1" fmla="val 50000"/>
-            </a:avLst>
-          </a:prstGeom>
-          <a:ln>
-            <a:solidFill>
-              <a:schemeClr val="accent1">
-                <a:lumMod val="50000"/>
-              </a:schemeClr>
-            </a:solidFill>
-          </a:ln>
-        </p:spPr>
-        <p:style>
-          <a:lnRef idx="1">
-            <a:schemeClr val="accent1"/>
-          </a:lnRef>
-          <a:fillRef idx="0">
-            <a:schemeClr val="accent1"/>
-          </a:fillRef>
-          <a:effectRef idx="0">
-            <a:schemeClr val="accent1"/>
-          </a:effectRef>
-          <a:fontRef idx="minor">
-            <a:schemeClr val="tx1"/>
-          </a:fontRef>
-        </p:style>
-      </p:cxnSp>
-      <p:sp>
-        <p:nvSpPr>
-          <p:cNvPr id="97" name="CaixaDeTexto 96">
-            <a:extLst>
-              <a:ext uri="{FF2B5EF4-FFF2-40B4-BE49-F238E27FC236}">
-                <a16:creationId xmlns:a16="http://schemas.microsoft.com/office/drawing/2014/main" id="{F9577E35-295B-4514-89E0-A704C1B4C443}"/>
-              </a:ext>
-            </a:extLst>
-          </p:cNvPr>
-          <p:cNvSpPr txBox="1"/>
-          <p:nvPr/>
-        </p:nvSpPr>
-        <p:spPr>
-          <a:xfrm>
-            <a:off x="5106783" y="4521040"/>
-            <a:ext cx="595565" cy="369332"/>
-          </a:xfrm>
-          <a:prstGeom prst="rect">
-            <a:avLst/>
-          </a:prstGeom>
-          <a:noFill/>
-          <a:ln>
-            <a:solidFill>
-              <a:schemeClr val="accent1">
-                <a:lumMod val="50000"/>
-              </a:schemeClr>
-            </a:solidFill>
-          </a:ln>
-        </p:spPr>
-        <p:txBody>
-          <a:bodyPr wrap="square" rtlCol="0">
-            <a:spAutoFit/>
-          </a:bodyPr>
-          <a:lstStyle/>
-          <a:p>
-            <a:r>
-              <a:rPr lang="pt-BR" dirty="0"/>
-              <a:t>Não</a:t>
-            </a:r>
-          </a:p>
-        </p:txBody>
-      </p:sp>
-      <p:sp>
-        <p:nvSpPr>
-          <p:cNvPr id="124" name="Losango 123">
-            <a:extLst>
-              <a:ext uri="{FF2B5EF4-FFF2-40B4-BE49-F238E27FC236}">
-                <a16:creationId xmlns:a16="http://schemas.microsoft.com/office/drawing/2014/main" id="{EE44D308-E3C0-4D0F-915C-02F5B6205606}"/>
-              </a:ext>
-            </a:extLst>
-          </p:cNvPr>
-          <p:cNvSpPr/>
-          <p:nvPr/>
-        </p:nvSpPr>
-        <p:spPr>
-          <a:xfrm>
-            <a:off x="9003532" y="1682605"/>
-            <a:ext cx="1047990" cy="987189"/>
-          </a:xfrm>
-          <a:prstGeom prst="diamond">
-            <a:avLst/>
-          </a:prstGeom>
-          <a:ln>
-            <a:solidFill>
-              <a:schemeClr val="accent1">
-                <a:lumMod val="50000"/>
-              </a:schemeClr>
-            </a:solidFill>
-          </a:ln>
-        </p:spPr>
-        <p:style>
-          <a:lnRef idx="0">
-            <a:schemeClr val="accent1"/>
-          </a:lnRef>
-          <a:fillRef idx="3">
-            <a:schemeClr val="accent1"/>
-          </a:fillRef>
-          <a:effectRef idx="3">
-            <a:schemeClr val="accent1"/>
-          </a:effectRef>
-          <a:fontRef idx="minor">
-            <a:schemeClr val="lt1"/>
-          </a:fontRef>
-        </p:style>
-        <p:txBody>
-          <a:bodyPr rtlCol="0" anchor="ctr"/>
-          <a:lstStyle/>
-          <a:p>
-            <a:pPr algn="ctr"/>
-            <a:endParaRPr lang="pt-BR"/>
-          </a:p>
-        </p:txBody>
-      </p:sp>
-      <p:cxnSp>
-        <p:nvCxnSpPr>
-          <p:cNvPr id="138" name="Conector: Angulado 137">
-            <a:extLst>
-              <a:ext uri="{FF2B5EF4-FFF2-40B4-BE49-F238E27FC236}">
-                <a16:creationId xmlns:a16="http://schemas.microsoft.com/office/drawing/2014/main" id="{D58C92F8-132F-4B74-81E3-44ACBF8655E9}"/>
-              </a:ext>
-            </a:extLst>
-          </p:cNvPr>
-          <p:cNvCxnSpPr>
-            <a:cxnSpLocks/>
-            <a:stCxn id="124" idx="2"/>
-            <a:endCxn id="51" idx="3"/>
-          </p:cNvCxnSpPr>
-          <p:nvPr/>
-        </p:nvCxnSpPr>
-        <p:spPr>
-          <a:xfrm rot="5400000">
-            <a:off x="6221841" y="2586708"/>
-            <a:ext cx="3222601" cy="3388772"/>
-          </a:xfrm>
-          <a:prstGeom prst="bentConnector2">
-            <a:avLst/>
-          </a:prstGeom>
-          <a:ln>
-            <a:solidFill>
-              <a:schemeClr val="accent1">
-                <a:lumMod val="50000"/>
-              </a:schemeClr>
-            </a:solidFill>
-          </a:ln>
-        </p:spPr>
-        <p:style>
-          <a:lnRef idx="1">
-            <a:schemeClr val="accent1"/>
-          </a:lnRef>
-          <a:fillRef idx="0">
-            <a:schemeClr val="accent1"/>
-          </a:fillRef>
-          <a:effectRef idx="0">
-            <a:schemeClr val="accent1"/>
-          </a:effectRef>
-          <a:fontRef idx="minor">
-            <a:schemeClr val="tx1"/>
-          </a:fontRef>
-        </p:style>
-      </p:cxnSp>
-      <p:cxnSp>
-        <p:nvCxnSpPr>
-          <p:cNvPr id="149" name="Conector: Angulado 148">
-            <a:extLst>
-              <a:ext uri="{FF2B5EF4-FFF2-40B4-BE49-F238E27FC236}">
-                <a16:creationId xmlns:a16="http://schemas.microsoft.com/office/drawing/2014/main" id="{07DF1E4D-D854-401E-8060-4935493E4ED9}"/>
-              </a:ext>
-            </a:extLst>
-          </p:cNvPr>
-          <p:cNvCxnSpPr>
-            <a:cxnSpLocks/>
-            <a:endCxn id="124" idx="3"/>
-          </p:cNvCxnSpPr>
-          <p:nvPr/>
-        </p:nvCxnSpPr>
-        <p:spPr>
-          <a:xfrm rot="16200000" flipV="1">
-            <a:off x="9549303" y="2678419"/>
-            <a:ext cx="1728424" cy="723986"/>
-          </a:xfrm>
-          <a:prstGeom prst="bentConnector2">
-            <a:avLst/>
-          </a:prstGeom>
-          <a:ln>
-            <a:solidFill>
-              <a:schemeClr val="accent1">
-                <a:lumMod val="50000"/>
-              </a:schemeClr>
-            </a:solidFill>
-          </a:ln>
-        </p:spPr>
-        <p:style>
-          <a:lnRef idx="1">
-            <a:schemeClr val="accent1"/>
-          </a:lnRef>
-          <a:fillRef idx="0">
-            <a:schemeClr val="accent1"/>
-          </a:fillRef>
-          <a:effectRef idx="0">
-            <a:schemeClr val="accent1"/>
-          </a:effectRef>
-          <a:fontRef idx="minor">
-            <a:schemeClr val="tx1"/>
-          </a:fontRef>
-        </p:style>
-      </p:cxnSp>
     </p:spTree>
     <p:extLst>
       <p:ext uri="{BB962C8B-B14F-4D97-AF65-F5344CB8AC3E}">
-        <p14:creationId xmlns:p14="http://schemas.microsoft.com/office/powerpoint/2010/main" val="3476203837"/>
+        <p14:creationId xmlns:p14="http://schemas.microsoft.com/office/powerpoint/2010/main" val="2247182570"/>
       </p:ext>
     </p:extLst>
   </p:cSld>
   <p:clrMapOvr>
     <a:masterClrMapping/>
   </p:clrMapOvr>
-  <mc:AlternateContent xmlns:mc="http://schemas.openxmlformats.org/markup-compatibility/2006" xmlns:p14="http://schemas.microsoft.com/office/powerpoint/2010/main">
-    <mc:Choice Requires="p14">
-      <p:transition spd="med" p14:dur="700">
-        <p:fade/>
-      </p:transition>
-    </mc:Choice>
-    <mc:Fallback xmlns="">
-      <p:transition spd="med">
-        <p:fade/>
-      </p:transition>
-    </mc:Fallback>
-  </mc:AlternateContent>
+  <p:transition spd="slow">
+    <p:push dir="u"/>
+  </p:transition>
 </p:sld>
 </file>
 
@@ -17035,1053 +15789,53 @@
           <a:p>
             <a:r>
               <a:rPr lang="pt-BR" dirty="0"/>
-              <a:t>N2</a:t>
+              <a:t>Processo de Atendimento</a:t>
             </a:r>
           </a:p>
         </p:txBody>
       </p:sp>
-      <p:sp>
-        <p:nvSpPr>
-          <p:cNvPr id="4" name="Retângulo Arredondado 2">
+      <p:pic>
+        <p:nvPicPr>
+          <p:cNvPr id="4" name="Imagem 3">
             <a:extLst>
               <a:ext uri="{FF2B5EF4-FFF2-40B4-BE49-F238E27FC236}">
-                <a16:creationId xmlns:a16="http://schemas.microsoft.com/office/drawing/2014/main" id="{406B10F4-AE9D-4D2A-951E-B544EC9AA262}"/>
+                <a16:creationId xmlns:a16="http://schemas.microsoft.com/office/drawing/2014/main" id="{15DEB315-9293-45A2-AC7A-7502E8BC517F}"/>
               </a:ext>
             </a:extLst>
           </p:cNvPr>
-          <p:cNvSpPr/>
-          <p:nvPr/>
-        </p:nvSpPr>
-        <p:spPr>
-          <a:xfrm>
-            <a:off x="529754" y="1743335"/>
-            <a:ext cx="1982978" cy="1282890"/>
-          </a:xfrm>
-          <a:prstGeom prst="roundRect">
-            <a:avLst/>
-          </a:prstGeom>
-          <a:ln>
-            <a:solidFill>
-              <a:schemeClr val="accent1">
-                <a:lumMod val="50000"/>
-              </a:schemeClr>
-            </a:solidFill>
-          </a:ln>
-        </p:spPr>
-        <p:style>
-          <a:lnRef idx="2">
-            <a:schemeClr val="accent6"/>
-          </a:lnRef>
-          <a:fillRef idx="1">
-            <a:schemeClr val="lt1"/>
-          </a:fillRef>
-          <a:effectRef idx="0">
-            <a:schemeClr val="accent6"/>
-          </a:effectRef>
-          <a:fontRef idx="minor">
-            <a:schemeClr val="dk1"/>
-          </a:fontRef>
-        </p:style>
-        <p:txBody>
-          <a:bodyPr rtlCol="0" anchor="ctr"/>
-          <a:lstStyle/>
-          <a:p>
-            <a:pPr algn="ctr"/>
-            <a:r>
-              <a:rPr lang="pt-BR" dirty="0"/>
-              <a:t>Informar o erro ao Suporte (N2).</a:t>
-            </a:r>
-          </a:p>
-        </p:txBody>
-      </p:sp>
-      <p:sp>
-        <p:nvSpPr>
-          <p:cNvPr id="7" name="Retângulo Arredondado 12">
-            <a:extLst>
-              <a:ext uri="{FF2B5EF4-FFF2-40B4-BE49-F238E27FC236}">
-                <a16:creationId xmlns:a16="http://schemas.microsoft.com/office/drawing/2014/main" id="{D783D561-6334-4CCA-AC1A-12D9B40D67E2}"/>
-              </a:ext>
-            </a:extLst>
-          </p:cNvPr>
-          <p:cNvSpPr/>
-          <p:nvPr/>
-        </p:nvSpPr>
-        <p:spPr>
-          <a:xfrm>
-            <a:off x="4886731" y="1594193"/>
-            <a:ext cx="1524206" cy="987188"/>
-          </a:xfrm>
-          <a:prstGeom prst="roundRect">
-            <a:avLst/>
-          </a:prstGeom>
-          <a:ln>
-            <a:solidFill>
-              <a:schemeClr val="accent1">
-                <a:lumMod val="50000"/>
-              </a:schemeClr>
-            </a:solidFill>
-          </a:ln>
-        </p:spPr>
-        <p:style>
-          <a:lnRef idx="2">
-            <a:schemeClr val="accent6"/>
-          </a:lnRef>
-          <a:fillRef idx="1">
-            <a:schemeClr val="lt1"/>
-          </a:fillRef>
-          <a:effectRef idx="0">
-            <a:schemeClr val="accent6"/>
-          </a:effectRef>
-          <a:fontRef idx="minor">
-            <a:schemeClr val="dk1"/>
-          </a:fontRef>
-        </p:style>
-        <p:txBody>
-          <a:bodyPr rtlCol="0" anchor="ctr"/>
-          <a:lstStyle/>
-          <a:p>
-            <a:pPr algn="ctr"/>
-            <a:r>
-              <a:rPr lang="pt-BR" sz="1600" dirty="0"/>
-              <a:t>Aplicar Solução para corrigir o problema</a:t>
-            </a:r>
-          </a:p>
-        </p:txBody>
-      </p:sp>
-      <p:sp>
-        <p:nvSpPr>
-          <p:cNvPr id="8" name="CaixaDeTexto 7">
-            <a:extLst>
-              <a:ext uri="{FF2B5EF4-FFF2-40B4-BE49-F238E27FC236}">
-                <a16:creationId xmlns:a16="http://schemas.microsoft.com/office/drawing/2014/main" id="{43CE3703-15E4-455F-908D-38D404D80484}"/>
-              </a:ext>
-            </a:extLst>
-          </p:cNvPr>
-          <p:cNvSpPr txBox="1"/>
-          <p:nvPr/>
-        </p:nvSpPr>
-        <p:spPr>
-          <a:xfrm>
-            <a:off x="7677923" y="3339509"/>
-            <a:ext cx="595565" cy="369332"/>
-          </a:xfrm>
-          <a:prstGeom prst="rect">
-            <a:avLst/>
-          </a:prstGeom>
-          <a:noFill/>
-          <a:ln>
-            <a:solidFill>
-              <a:schemeClr val="accent1">
-                <a:lumMod val="50000"/>
-              </a:schemeClr>
-            </a:solidFill>
-          </a:ln>
-        </p:spPr>
-        <p:txBody>
-          <a:bodyPr wrap="square" rtlCol="0">
-            <a:spAutoFit/>
-          </a:bodyPr>
-          <a:lstStyle/>
-          <a:p>
-            <a:r>
-              <a:rPr lang="pt-BR" dirty="0"/>
-              <a:t>Não</a:t>
-            </a:r>
-          </a:p>
-        </p:txBody>
-      </p:sp>
-      <p:cxnSp>
-        <p:nvCxnSpPr>
-          <p:cNvPr id="9" name="Conector reto 8">
-            <a:extLst>
-              <a:ext uri="{FF2B5EF4-FFF2-40B4-BE49-F238E27FC236}">
-                <a16:creationId xmlns:a16="http://schemas.microsoft.com/office/drawing/2014/main" id="{1E7E25B8-C045-49EC-A50A-3C8D1576CEFB}"/>
-              </a:ext>
-            </a:extLst>
-          </p:cNvPr>
-          <p:cNvCxnSpPr>
-            <a:cxnSpLocks/>
-          </p:cNvCxnSpPr>
-          <p:nvPr/>
-        </p:nvCxnSpPr>
-        <p:spPr>
-          <a:xfrm>
-            <a:off x="8018792" y="3717153"/>
-            <a:ext cx="17842" cy="0"/>
-          </a:xfrm>
-          <a:prstGeom prst="line">
-            <a:avLst/>
-          </a:prstGeom>
-          <a:ln>
-            <a:solidFill>
-              <a:schemeClr val="accent1">
-                <a:lumMod val="50000"/>
-              </a:schemeClr>
-            </a:solidFill>
-          </a:ln>
-        </p:spPr>
-        <p:style>
-          <a:lnRef idx="1">
-            <a:schemeClr val="accent6"/>
-          </a:lnRef>
-          <a:fillRef idx="0">
-            <a:schemeClr val="accent6"/>
-          </a:fillRef>
-          <a:effectRef idx="0">
-            <a:schemeClr val="accent6"/>
-          </a:effectRef>
-          <a:fontRef idx="minor">
-            <a:schemeClr val="tx1"/>
-          </a:fontRef>
-        </p:style>
-      </p:cxnSp>
-      <p:sp>
-        <p:nvSpPr>
-          <p:cNvPr id="10" name="Retângulo Arredondado 34">
-            <a:extLst>
-              <a:ext uri="{FF2B5EF4-FFF2-40B4-BE49-F238E27FC236}">
-                <a16:creationId xmlns:a16="http://schemas.microsoft.com/office/drawing/2014/main" id="{5469E8A7-A995-47C8-83D3-B52E52D78BB0}"/>
-              </a:ext>
-            </a:extLst>
-          </p:cNvPr>
-          <p:cNvSpPr/>
-          <p:nvPr/>
-        </p:nvSpPr>
-        <p:spPr>
-          <a:xfrm>
-            <a:off x="3099540" y="5508229"/>
-            <a:ext cx="1909511" cy="768331"/>
-          </a:xfrm>
-          <a:prstGeom prst="roundRect">
-            <a:avLst/>
-          </a:prstGeom>
-          <a:ln>
-            <a:solidFill>
-              <a:schemeClr val="accent1">
-                <a:lumMod val="50000"/>
-              </a:schemeClr>
-            </a:solidFill>
-          </a:ln>
-        </p:spPr>
-        <p:style>
-          <a:lnRef idx="2">
-            <a:schemeClr val="accent6"/>
-          </a:lnRef>
-          <a:fillRef idx="1">
-            <a:schemeClr val="lt1"/>
-          </a:fillRef>
-          <a:effectRef idx="0">
-            <a:schemeClr val="accent6"/>
-          </a:effectRef>
-          <a:fontRef idx="minor">
-            <a:schemeClr val="dk1"/>
-          </a:fontRef>
-        </p:style>
-        <p:txBody>
-          <a:bodyPr rtlCol="0" anchor="ctr"/>
-          <a:lstStyle/>
-          <a:p>
-            <a:pPr algn="ctr"/>
-            <a:r>
-              <a:rPr lang="pt-BR" dirty="0"/>
-              <a:t>Solicitar auxilio do Coordenador(N3)</a:t>
-            </a:r>
-          </a:p>
-        </p:txBody>
-      </p:sp>
-      <p:sp>
-        <p:nvSpPr>
-          <p:cNvPr id="11" name="Retângulo Arredondado 35">
-            <a:extLst>
-              <a:ext uri="{FF2B5EF4-FFF2-40B4-BE49-F238E27FC236}">
-                <a16:creationId xmlns:a16="http://schemas.microsoft.com/office/drawing/2014/main" id="{5A9557A5-78D4-4A9B-ACA3-0A5668B9EB61}"/>
-              </a:ext>
-            </a:extLst>
-          </p:cNvPr>
-          <p:cNvSpPr/>
-          <p:nvPr/>
-        </p:nvSpPr>
-        <p:spPr>
-          <a:xfrm>
-            <a:off x="8550147" y="3929067"/>
-            <a:ext cx="2196477" cy="1282890"/>
-          </a:xfrm>
-          <a:prstGeom prst="roundRect">
-            <a:avLst/>
-          </a:prstGeom>
-          <a:ln>
-            <a:solidFill>
-              <a:schemeClr val="accent1">
-                <a:lumMod val="50000"/>
-              </a:schemeClr>
-            </a:solidFill>
-          </a:ln>
-        </p:spPr>
-        <p:style>
-          <a:lnRef idx="2">
-            <a:schemeClr val="accent6"/>
-          </a:lnRef>
-          <a:fillRef idx="1">
-            <a:schemeClr val="lt1"/>
-          </a:fillRef>
-          <a:effectRef idx="0">
-            <a:schemeClr val="accent6"/>
-          </a:effectRef>
-          <a:fontRef idx="minor">
-            <a:schemeClr val="dk1"/>
-          </a:fontRef>
-        </p:style>
-        <p:txBody>
-          <a:bodyPr rtlCol="0" anchor="ctr"/>
-          <a:lstStyle/>
-          <a:p>
-            <a:pPr algn="ctr"/>
-            <a:r>
-              <a:rPr lang="pt-BR" dirty="0"/>
-              <a:t>Informa o ocorrido/solução aplicada e finalizar o chamado.</a:t>
-            </a:r>
-          </a:p>
-        </p:txBody>
-      </p:sp>
-      <p:sp>
-        <p:nvSpPr>
-          <p:cNvPr id="12" name="CaixaDeTexto 11">
-            <a:extLst>
-              <a:ext uri="{FF2B5EF4-FFF2-40B4-BE49-F238E27FC236}">
-                <a16:creationId xmlns:a16="http://schemas.microsoft.com/office/drawing/2014/main" id="{3DBE9A4C-AC0D-471C-945E-86171F91348B}"/>
-              </a:ext>
-            </a:extLst>
-          </p:cNvPr>
-          <p:cNvSpPr txBox="1"/>
-          <p:nvPr/>
-        </p:nvSpPr>
-        <p:spPr>
-          <a:xfrm>
-            <a:off x="8901129" y="1816898"/>
-            <a:ext cx="555096" cy="369332"/>
-          </a:xfrm>
-          <a:prstGeom prst="rect">
-            <a:avLst/>
-          </a:prstGeom>
-          <a:noFill/>
-          <a:ln>
-            <a:solidFill>
-              <a:schemeClr val="accent1">
-                <a:lumMod val="50000"/>
-              </a:schemeClr>
-            </a:solidFill>
-          </a:ln>
-        </p:spPr>
-        <p:txBody>
-          <a:bodyPr wrap="square" rtlCol="0">
-            <a:spAutoFit/>
-          </a:bodyPr>
-          <a:lstStyle/>
-          <a:p>
-            <a:r>
-              <a:rPr lang="pt-BR" dirty="0"/>
-              <a:t>Sim</a:t>
-            </a:r>
-          </a:p>
-        </p:txBody>
-      </p:sp>
-      <p:sp>
-        <p:nvSpPr>
-          <p:cNvPr id="13" name="Elipse 12">
-            <a:extLst>
-              <a:ext uri="{FF2B5EF4-FFF2-40B4-BE49-F238E27FC236}">
-                <a16:creationId xmlns:a16="http://schemas.microsoft.com/office/drawing/2014/main" id="{91C96793-785A-4E3E-A589-9017D9F6D751}"/>
-              </a:ext>
-            </a:extLst>
-          </p:cNvPr>
-          <p:cNvSpPr/>
-          <p:nvPr/>
-        </p:nvSpPr>
-        <p:spPr>
-          <a:xfrm>
-            <a:off x="9178677" y="5688466"/>
-            <a:ext cx="931798" cy="914400"/>
-          </a:xfrm>
-          <a:prstGeom prst="ellipse">
-            <a:avLst/>
-          </a:prstGeom>
-          <a:ln>
-            <a:solidFill>
-              <a:schemeClr val="accent1">
-                <a:lumMod val="50000"/>
-              </a:schemeClr>
-            </a:solidFill>
-          </a:ln>
-        </p:spPr>
-        <p:style>
-          <a:lnRef idx="2">
-            <a:schemeClr val="accent3"/>
-          </a:lnRef>
-          <a:fillRef idx="1">
-            <a:schemeClr val="lt1"/>
-          </a:fillRef>
-          <a:effectRef idx="0">
-            <a:schemeClr val="accent3"/>
-          </a:effectRef>
-          <a:fontRef idx="minor">
-            <a:schemeClr val="dk1"/>
-          </a:fontRef>
-        </p:style>
-        <p:txBody>
-          <a:bodyPr rtlCol="0" anchor="ctr"/>
-          <a:lstStyle/>
-          <a:p>
-            <a:pPr algn="ctr"/>
-            <a:r>
-              <a:rPr lang="pt-BR" dirty="0">
-                <a:solidFill>
-                  <a:schemeClr val="tx1"/>
-                </a:solidFill>
-              </a:rPr>
-              <a:t>Fim</a:t>
-            </a:r>
-          </a:p>
-        </p:txBody>
-      </p:sp>
-      <p:cxnSp>
-        <p:nvCxnSpPr>
-          <p:cNvPr id="14" name="Conector reto 13">
-            <a:extLst>
-              <a:ext uri="{FF2B5EF4-FFF2-40B4-BE49-F238E27FC236}">
-                <a16:creationId xmlns:a16="http://schemas.microsoft.com/office/drawing/2014/main" id="{41EBCF27-9AE9-49C1-966A-5325B607D65D}"/>
-              </a:ext>
-            </a:extLst>
-          </p:cNvPr>
-          <p:cNvCxnSpPr>
-            <a:cxnSpLocks/>
-            <a:stCxn id="11" idx="2"/>
-            <a:endCxn id="13" idx="0"/>
-          </p:cNvCxnSpPr>
-          <p:nvPr/>
-        </p:nvCxnSpPr>
-        <p:spPr>
-          <a:xfrm flipH="1">
-            <a:off x="9644576" y="5211957"/>
-            <a:ext cx="3810" cy="476509"/>
-          </a:xfrm>
-          <a:prstGeom prst="line">
-            <a:avLst/>
-          </a:prstGeom>
-          <a:ln>
-            <a:solidFill>
-              <a:schemeClr val="accent1">
-                <a:lumMod val="50000"/>
-              </a:schemeClr>
-            </a:solidFill>
-          </a:ln>
-        </p:spPr>
-        <p:style>
-          <a:lnRef idx="1">
-            <a:schemeClr val="accent2"/>
-          </a:lnRef>
-          <a:fillRef idx="0">
-            <a:schemeClr val="accent2"/>
-          </a:fillRef>
-          <a:effectRef idx="0">
-            <a:schemeClr val="accent2"/>
-          </a:effectRef>
-          <a:fontRef idx="minor">
-            <a:schemeClr val="tx1"/>
-          </a:fontRef>
-        </p:style>
-      </p:cxnSp>
-      <p:cxnSp>
-        <p:nvCxnSpPr>
-          <p:cNvPr id="15" name="Conector: Angulado 14">
-            <a:extLst>
-              <a:ext uri="{FF2B5EF4-FFF2-40B4-BE49-F238E27FC236}">
-                <a16:creationId xmlns:a16="http://schemas.microsoft.com/office/drawing/2014/main" id="{1327E17B-177B-49E9-A598-D8D9A5ED4D7B}"/>
-              </a:ext>
-            </a:extLst>
-          </p:cNvPr>
-          <p:cNvCxnSpPr>
-            <a:cxnSpLocks/>
-          </p:cNvCxnSpPr>
-          <p:nvPr/>
-        </p:nvCxnSpPr>
-        <p:spPr>
-          <a:xfrm>
-            <a:off x="6410937" y="1973127"/>
-            <a:ext cx="1340571" cy="203073"/>
-          </a:xfrm>
-          <a:prstGeom prst="bentConnector3">
-            <a:avLst>
-              <a:gd name="adj1" fmla="val 50000"/>
-            </a:avLst>
-          </a:prstGeom>
-          <a:ln>
-            <a:solidFill>
-              <a:schemeClr val="accent1">
-                <a:lumMod val="50000"/>
-              </a:schemeClr>
-            </a:solidFill>
-          </a:ln>
-        </p:spPr>
-        <p:style>
-          <a:lnRef idx="1">
-            <a:schemeClr val="accent1"/>
-          </a:lnRef>
-          <a:fillRef idx="0">
-            <a:schemeClr val="accent1"/>
-          </a:fillRef>
-          <a:effectRef idx="0">
-            <a:schemeClr val="accent1"/>
-          </a:effectRef>
-          <a:fontRef idx="minor">
-            <a:schemeClr val="tx1"/>
-          </a:fontRef>
-        </p:style>
-      </p:cxnSp>
-      <p:sp>
-        <p:nvSpPr>
-          <p:cNvPr id="17" name="Losango 16">
-            <a:extLst>
-              <a:ext uri="{FF2B5EF4-FFF2-40B4-BE49-F238E27FC236}">
-                <a16:creationId xmlns:a16="http://schemas.microsoft.com/office/drawing/2014/main" id="{335F970D-1550-43B1-88BE-83BF817277D5}"/>
-              </a:ext>
-            </a:extLst>
-          </p:cNvPr>
-          <p:cNvSpPr/>
-          <p:nvPr/>
-        </p:nvSpPr>
-        <p:spPr>
-          <a:xfrm>
-            <a:off x="3339828" y="3207374"/>
-            <a:ext cx="1047990" cy="987189"/>
-          </a:xfrm>
-          <a:prstGeom prst="diamond">
-            <a:avLst/>
-          </a:prstGeom>
-          <a:ln>
-            <a:solidFill>
-              <a:schemeClr val="accent1">
-                <a:lumMod val="50000"/>
-              </a:schemeClr>
-            </a:solidFill>
-          </a:ln>
-        </p:spPr>
-        <p:style>
-          <a:lnRef idx="0">
-            <a:schemeClr val="accent1"/>
-          </a:lnRef>
-          <a:fillRef idx="3">
-            <a:schemeClr val="accent1"/>
-          </a:fillRef>
-          <a:effectRef idx="3">
-            <a:schemeClr val="accent1"/>
-          </a:effectRef>
-          <a:fontRef idx="minor">
-            <a:schemeClr val="lt1"/>
-          </a:fontRef>
-        </p:style>
-        <p:txBody>
-          <a:bodyPr rtlCol="0" anchor="ctr"/>
-          <a:lstStyle/>
-          <a:p>
-            <a:pPr algn="ctr"/>
-            <a:endParaRPr lang="pt-BR"/>
-          </a:p>
-        </p:txBody>
-      </p:sp>
-      <p:cxnSp>
-        <p:nvCxnSpPr>
-          <p:cNvPr id="18" name="Conector: Angulado 17">
-            <a:extLst>
-              <a:ext uri="{FF2B5EF4-FFF2-40B4-BE49-F238E27FC236}">
-                <a16:creationId xmlns:a16="http://schemas.microsoft.com/office/drawing/2014/main" id="{8F6199AF-B2C5-41BF-99CD-C2D352AE3C67}"/>
-              </a:ext>
-            </a:extLst>
-          </p:cNvPr>
-          <p:cNvCxnSpPr>
-            <a:cxnSpLocks/>
-            <a:stCxn id="7" idx="1"/>
-            <a:endCxn id="17" idx="0"/>
-          </p:cNvCxnSpPr>
-          <p:nvPr/>
-        </p:nvCxnSpPr>
-        <p:spPr>
-          <a:xfrm rot="10800000" flipV="1">
-            <a:off x="3863823" y="2087786"/>
-            <a:ext cx="1022908" cy="1119587"/>
-          </a:xfrm>
-          <a:prstGeom prst="bentConnector2">
-            <a:avLst/>
-          </a:prstGeom>
-          <a:ln>
-            <a:solidFill>
-              <a:schemeClr val="accent1">
-                <a:lumMod val="50000"/>
-              </a:schemeClr>
-            </a:solidFill>
-          </a:ln>
-        </p:spPr>
-        <p:style>
-          <a:lnRef idx="1">
-            <a:schemeClr val="accent1"/>
-          </a:lnRef>
-          <a:fillRef idx="0">
-            <a:schemeClr val="accent1"/>
-          </a:fillRef>
-          <a:effectRef idx="0">
-            <a:schemeClr val="accent1"/>
-          </a:effectRef>
-          <a:fontRef idx="minor">
-            <a:schemeClr val="tx1"/>
-          </a:fontRef>
-        </p:style>
-      </p:cxnSp>
-      <p:sp>
-        <p:nvSpPr>
-          <p:cNvPr id="19" name="CaixaDeTexto 18">
-            <a:extLst>
-              <a:ext uri="{FF2B5EF4-FFF2-40B4-BE49-F238E27FC236}">
-                <a16:creationId xmlns:a16="http://schemas.microsoft.com/office/drawing/2014/main" id="{8DE71CD8-F312-40EB-A993-FAC43C7E829C}"/>
-              </a:ext>
-            </a:extLst>
-          </p:cNvPr>
-          <p:cNvSpPr txBox="1"/>
-          <p:nvPr/>
-        </p:nvSpPr>
-        <p:spPr>
-          <a:xfrm>
-            <a:off x="3929570" y="1709042"/>
-            <a:ext cx="555096" cy="369332"/>
-          </a:xfrm>
-          <a:prstGeom prst="rect">
-            <a:avLst/>
-          </a:prstGeom>
-          <a:noFill/>
-          <a:ln>
-            <a:solidFill>
-              <a:schemeClr val="accent1">
-                <a:lumMod val="50000"/>
-              </a:schemeClr>
-            </a:solidFill>
-          </a:ln>
-        </p:spPr>
-        <p:txBody>
-          <a:bodyPr wrap="square" rtlCol="0">
-            <a:spAutoFit/>
-          </a:bodyPr>
-          <a:lstStyle/>
-          <a:p>
-            <a:r>
-              <a:rPr lang="pt-BR" dirty="0"/>
-              <a:t>Sim</a:t>
-            </a:r>
-          </a:p>
-        </p:txBody>
-      </p:sp>
-      <p:cxnSp>
-        <p:nvCxnSpPr>
-          <p:cNvPr id="21" name="Conector: Angulado 20">
-            <a:extLst>
-              <a:ext uri="{FF2B5EF4-FFF2-40B4-BE49-F238E27FC236}">
-                <a16:creationId xmlns:a16="http://schemas.microsoft.com/office/drawing/2014/main" id="{530D4D88-2282-4B7C-A782-9871F1A52D84}"/>
-              </a:ext>
-            </a:extLst>
-          </p:cNvPr>
-          <p:cNvCxnSpPr>
-            <a:cxnSpLocks/>
-          </p:cNvCxnSpPr>
-          <p:nvPr/>
-        </p:nvCxnSpPr>
-        <p:spPr>
-          <a:xfrm rot="16200000" flipH="1">
-            <a:off x="3201547" y="4851396"/>
-            <a:ext cx="1313670" cy="2"/>
-          </a:xfrm>
-          <a:prstGeom prst="bentConnector3">
-            <a:avLst>
-              <a:gd name="adj1" fmla="val 50000"/>
-            </a:avLst>
-          </a:prstGeom>
-          <a:ln>
-            <a:solidFill>
-              <a:schemeClr val="accent1">
-                <a:lumMod val="50000"/>
-              </a:schemeClr>
-            </a:solidFill>
-          </a:ln>
-        </p:spPr>
-        <p:style>
-          <a:lnRef idx="1">
-            <a:schemeClr val="accent1"/>
-          </a:lnRef>
-          <a:fillRef idx="0">
-            <a:schemeClr val="accent1"/>
-          </a:fillRef>
-          <a:effectRef idx="0">
-            <a:schemeClr val="accent1"/>
-          </a:effectRef>
-          <a:fontRef idx="minor">
-            <a:schemeClr val="tx1"/>
-          </a:fontRef>
-        </p:style>
-      </p:cxnSp>
-      <p:sp>
-        <p:nvSpPr>
-          <p:cNvPr id="22" name="CaixaDeTexto 21">
-            <a:extLst>
-              <a:ext uri="{FF2B5EF4-FFF2-40B4-BE49-F238E27FC236}">
-                <a16:creationId xmlns:a16="http://schemas.microsoft.com/office/drawing/2014/main" id="{77EEBDC3-ADC0-4C3D-9567-59104E7337DD}"/>
-              </a:ext>
-            </a:extLst>
-          </p:cNvPr>
-          <p:cNvSpPr txBox="1"/>
-          <p:nvPr/>
-        </p:nvSpPr>
-        <p:spPr>
-          <a:xfrm>
-            <a:off x="3854759" y="4521040"/>
-            <a:ext cx="595565" cy="369332"/>
-          </a:xfrm>
-          <a:prstGeom prst="rect">
-            <a:avLst/>
-          </a:prstGeom>
-          <a:noFill/>
-          <a:ln>
-            <a:solidFill>
-              <a:schemeClr val="accent1">
-                <a:lumMod val="50000"/>
-              </a:schemeClr>
-            </a:solidFill>
-          </a:ln>
-        </p:spPr>
-        <p:txBody>
-          <a:bodyPr wrap="square" rtlCol="0">
-            <a:spAutoFit/>
-          </a:bodyPr>
-          <a:lstStyle/>
-          <a:p>
-            <a:r>
-              <a:rPr lang="pt-BR" dirty="0"/>
-              <a:t>Não</a:t>
-            </a:r>
-          </a:p>
-        </p:txBody>
-      </p:sp>
-      <p:sp>
-        <p:nvSpPr>
-          <p:cNvPr id="23" name="Losango 22">
-            <a:extLst>
-              <a:ext uri="{FF2B5EF4-FFF2-40B4-BE49-F238E27FC236}">
-                <a16:creationId xmlns:a16="http://schemas.microsoft.com/office/drawing/2014/main" id="{6C4FE539-3C4E-41B0-A80F-07F0BA3C8745}"/>
-              </a:ext>
-            </a:extLst>
-          </p:cNvPr>
-          <p:cNvSpPr/>
-          <p:nvPr/>
-        </p:nvSpPr>
-        <p:spPr>
-          <a:xfrm>
-            <a:off x="7751508" y="1682605"/>
-            <a:ext cx="1047990" cy="987189"/>
-          </a:xfrm>
-          <a:prstGeom prst="diamond">
-            <a:avLst/>
-          </a:prstGeom>
-          <a:ln>
-            <a:solidFill>
-              <a:schemeClr val="accent1">
-                <a:lumMod val="50000"/>
-              </a:schemeClr>
-            </a:solidFill>
-          </a:ln>
-        </p:spPr>
-        <p:style>
-          <a:lnRef idx="0">
-            <a:schemeClr val="accent1"/>
-          </a:lnRef>
-          <a:fillRef idx="3">
-            <a:schemeClr val="accent1"/>
-          </a:fillRef>
-          <a:effectRef idx="3">
-            <a:schemeClr val="accent1"/>
-          </a:effectRef>
-          <a:fontRef idx="minor">
-            <a:schemeClr val="lt1"/>
-          </a:fontRef>
-        </p:style>
-        <p:txBody>
-          <a:bodyPr rtlCol="0" anchor="ctr"/>
-          <a:lstStyle/>
-          <a:p>
-            <a:pPr algn="ctr"/>
-            <a:endParaRPr lang="pt-BR"/>
-          </a:p>
-        </p:txBody>
-      </p:sp>
-      <p:cxnSp>
-        <p:nvCxnSpPr>
-          <p:cNvPr id="24" name="Conector: Angulado 23">
-            <a:extLst>
-              <a:ext uri="{FF2B5EF4-FFF2-40B4-BE49-F238E27FC236}">
-                <a16:creationId xmlns:a16="http://schemas.microsoft.com/office/drawing/2014/main" id="{B377DA46-A0B4-454C-A698-B7372CC74A29}"/>
-              </a:ext>
-            </a:extLst>
-          </p:cNvPr>
-          <p:cNvCxnSpPr>
-            <a:cxnSpLocks/>
-            <a:stCxn id="23" idx="2"/>
-            <a:endCxn id="10" idx="3"/>
-          </p:cNvCxnSpPr>
-          <p:nvPr/>
-        </p:nvCxnSpPr>
-        <p:spPr>
-          <a:xfrm rot="5400000">
-            <a:off x="5030977" y="2647868"/>
-            <a:ext cx="3222601" cy="3266452"/>
-          </a:xfrm>
-          <a:prstGeom prst="bentConnector2">
-            <a:avLst/>
-          </a:prstGeom>
-          <a:ln>
-            <a:solidFill>
-              <a:schemeClr val="accent1">
-                <a:lumMod val="50000"/>
-              </a:schemeClr>
-            </a:solidFill>
-          </a:ln>
-        </p:spPr>
-        <p:style>
-          <a:lnRef idx="1">
-            <a:schemeClr val="accent1"/>
-          </a:lnRef>
-          <a:fillRef idx="0">
-            <a:schemeClr val="accent1"/>
-          </a:fillRef>
-          <a:effectRef idx="0">
-            <a:schemeClr val="accent1"/>
-          </a:effectRef>
-          <a:fontRef idx="minor">
-            <a:schemeClr val="tx1"/>
-          </a:fontRef>
-        </p:style>
-      </p:cxnSp>
-      <p:cxnSp>
-        <p:nvCxnSpPr>
-          <p:cNvPr id="25" name="Conector: Angulado 24">
-            <a:extLst>
-              <a:ext uri="{FF2B5EF4-FFF2-40B4-BE49-F238E27FC236}">
-                <a16:creationId xmlns:a16="http://schemas.microsoft.com/office/drawing/2014/main" id="{AD80F8F8-2257-4C6C-9331-A6A97DFA01FA}"/>
-              </a:ext>
-            </a:extLst>
-          </p:cNvPr>
-          <p:cNvCxnSpPr>
-            <a:cxnSpLocks/>
-            <a:endCxn id="23" idx="3"/>
-          </p:cNvCxnSpPr>
-          <p:nvPr/>
-        </p:nvCxnSpPr>
-        <p:spPr>
-          <a:xfrm rot="16200000" flipV="1">
-            <a:off x="8297279" y="2678419"/>
-            <a:ext cx="1728424" cy="723986"/>
-          </a:xfrm>
-          <a:prstGeom prst="bentConnector2">
-            <a:avLst/>
-          </a:prstGeom>
-          <a:ln>
-            <a:solidFill>
-              <a:schemeClr val="accent1">
-                <a:lumMod val="50000"/>
-              </a:schemeClr>
-            </a:solidFill>
-          </a:ln>
-        </p:spPr>
-        <p:style>
-          <a:lnRef idx="1">
-            <a:schemeClr val="accent1"/>
-          </a:lnRef>
-          <a:fillRef idx="0">
-            <a:schemeClr val="accent1"/>
-          </a:fillRef>
-          <a:effectRef idx="0">
-            <a:schemeClr val="accent1"/>
-          </a:effectRef>
-          <a:fontRef idx="minor">
-            <a:schemeClr val="tx1"/>
-          </a:fontRef>
-        </p:style>
-      </p:cxnSp>
-      <p:sp>
-        <p:nvSpPr>
-          <p:cNvPr id="34" name="Retângulo Arredondado 2">
-            <a:extLst>
-              <a:ext uri="{FF2B5EF4-FFF2-40B4-BE49-F238E27FC236}">
-                <a16:creationId xmlns:a16="http://schemas.microsoft.com/office/drawing/2014/main" id="{A5C170B2-095C-4A78-B895-F9FE7EABAC25}"/>
-              </a:ext>
-            </a:extLst>
-          </p:cNvPr>
-          <p:cNvSpPr/>
-          <p:nvPr/>
-        </p:nvSpPr>
-        <p:spPr>
-          <a:xfrm>
-            <a:off x="1031656" y="4422448"/>
-            <a:ext cx="1425121" cy="532726"/>
-          </a:xfrm>
-          <a:prstGeom prst="roundRect">
-            <a:avLst/>
-          </a:prstGeom>
-          <a:ln>
-            <a:solidFill>
-              <a:schemeClr val="accent1">
-                <a:lumMod val="50000"/>
-              </a:schemeClr>
-            </a:solidFill>
-          </a:ln>
-        </p:spPr>
-        <p:style>
-          <a:lnRef idx="2">
-            <a:schemeClr val="accent6"/>
-          </a:lnRef>
-          <a:fillRef idx="1">
-            <a:schemeClr val="lt1"/>
-          </a:fillRef>
-          <a:effectRef idx="0">
-            <a:schemeClr val="accent6"/>
-          </a:effectRef>
-          <a:fontRef idx="minor">
-            <a:schemeClr val="dk1"/>
-          </a:fontRef>
-        </p:style>
-        <p:txBody>
-          <a:bodyPr rtlCol="0" anchor="ctr"/>
-          <a:lstStyle/>
-          <a:p>
-            <a:pPr algn="ctr"/>
-            <a:r>
-              <a:rPr lang="pt-BR" dirty="0"/>
-              <a:t>Erro encontrado?</a:t>
-            </a:r>
-          </a:p>
-        </p:txBody>
-      </p:sp>
-      <p:cxnSp>
-        <p:nvCxnSpPr>
-          <p:cNvPr id="35" name="Conector: Angulado 34">
-            <a:extLst>
-              <a:ext uri="{FF2B5EF4-FFF2-40B4-BE49-F238E27FC236}">
-                <a16:creationId xmlns:a16="http://schemas.microsoft.com/office/drawing/2014/main" id="{76151D6E-3A00-4ED7-96B7-6E074D8EE4F1}"/>
-              </a:ext>
-            </a:extLst>
-          </p:cNvPr>
-          <p:cNvCxnSpPr>
-            <a:cxnSpLocks/>
-          </p:cNvCxnSpPr>
-          <p:nvPr/>
-        </p:nvCxnSpPr>
-        <p:spPr>
-          <a:xfrm rot="5400000">
-            <a:off x="764179" y="3442410"/>
-            <a:ext cx="1396222" cy="563853"/>
-          </a:xfrm>
-          <a:prstGeom prst="bentConnector3">
-            <a:avLst>
-              <a:gd name="adj1" fmla="val 99371"/>
-            </a:avLst>
-          </a:prstGeom>
-          <a:ln>
-            <a:solidFill>
-              <a:schemeClr val="accent1">
-                <a:lumMod val="50000"/>
-              </a:schemeClr>
-            </a:solidFill>
-          </a:ln>
-        </p:spPr>
-        <p:style>
-          <a:lnRef idx="1">
-            <a:schemeClr val="accent1"/>
-          </a:lnRef>
-          <a:fillRef idx="0">
-            <a:schemeClr val="accent1"/>
-          </a:fillRef>
-          <a:effectRef idx="0">
-            <a:schemeClr val="accent1"/>
-          </a:effectRef>
-          <a:fontRef idx="minor">
-            <a:schemeClr val="tx1"/>
-          </a:fontRef>
-        </p:style>
-      </p:cxnSp>
-      <p:cxnSp>
-        <p:nvCxnSpPr>
-          <p:cNvPr id="40" name="Conector: Angulado 39">
-            <a:extLst>
-              <a:ext uri="{FF2B5EF4-FFF2-40B4-BE49-F238E27FC236}">
-                <a16:creationId xmlns:a16="http://schemas.microsoft.com/office/drawing/2014/main" id="{58010759-5893-43BC-8AFA-68CB3E3D0376}"/>
-              </a:ext>
-            </a:extLst>
-          </p:cNvPr>
-          <p:cNvCxnSpPr>
-            <a:cxnSpLocks/>
-            <a:stCxn id="17" idx="1"/>
-            <a:endCxn id="34" idx="3"/>
-          </p:cNvCxnSpPr>
-          <p:nvPr/>
-        </p:nvCxnSpPr>
-        <p:spPr>
-          <a:xfrm rot="10800000" flipV="1">
-            <a:off x="2456778" y="3700969"/>
-            <a:ext cx="883051" cy="987842"/>
-          </a:xfrm>
-          <a:prstGeom prst="bentConnector3">
-            <a:avLst>
-              <a:gd name="adj1" fmla="val 50000"/>
-            </a:avLst>
-          </a:prstGeom>
-          <a:ln>
-            <a:solidFill>
-              <a:schemeClr val="accent1">
-                <a:lumMod val="50000"/>
-              </a:schemeClr>
-            </a:solidFill>
-          </a:ln>
-        </p:spPr>
-        <p:style>
-          <a:lnRef idx="1">
-            <a:schemeClr val="accent1"/>
-          </a:lnRef>
-          <a:fillRef idx="0">
-            <a:schemeClr val="accent1"/>
-          </a:fillRef>
-          <a:effectRef idx="0">
-            <a:schemeClr val="accent1"/>
-          </a:effectRef>
-          <a:fontRef idx="minor">
-            <a:schemeClr val="tx1"/>
-          </a:fontRef>
-        </p:style>
-      </p:cxnSp>
+          <p:cNvPicPr>
+            <a:picLocks noChangeAspect="1"/>
+          </p:cNvPicPr>
+          <p:nvPr/>
+        </p:nvPicPr>
+        <p:blipFill rotWithShape="1">
+          <a:blip r:embed="rId2"/>
+          <a:srcRect l="25429" b="900"/>
+          <a:stretch/>
+        </p:blipFill>
+        <p:spPr>
+          <a:xfrm>
+            <a:off x="35542" y="2414912"/>
+            <a:ext cx="12120915" cy="3157213"/>
+          </a:xfrm>
+          <a:prstGeom prst="rect">
+            <a:avLst/>
+          </a:prstGeom>
+        </p:spPr>
+      </p:pic>
     </p:spTree>
     <p:extLst>
       <p:ext uri="{BB962C8B-B14F-4D97-AF65-F5344CB8AC3E}">
-        <p14:creationId xmlns:p14="http://schemas.microsoft.com/office/powerpoint/2010/main" val="1504165642"/>
+        <p14:creationId xmlns:p14="http://schemas.microsoft.com/office/powerpoint/2010/main" val="1246393557"/>
       </p:ext>
     </p:extLst>
   </p:cSld>
   <p:clrMapOvr>
     <a:masterClrMapping/>
   </p:clrMapOvr>
-  <mc:AlternateContent xmlns:mc="http://schemas.openxmlformats.org/markup-compatibility/2006" xmlns:p14="http://schemas.microsoft.com/office/powerpoint/2010/main">
-    <mc:Choice Requires="p14">
-      <p:transition spd="med" p14:dur="700">
-        <p:fade/>
-      </p:transition>
-    </mc:Choice>
-    <mc:Fallback xmlns="">
-      <p:transition spd="med">
-        <p:fade/>
-      </p:transition>
-    </mc:Fallback>
-  </mc:AlternateContent>
+  <p:transition spd="med">
+    <p:pull/>
+  </p:transition>
 </p:sld>
 </file>
 
@@ -18107,916 +15861,6 @@
           <p:cNvPr id="2" name="Título 1">
             <a:extLst>
               <a:ext uri="{FF2B5EF4-FFF2-40B4-BE49-F238E27FC236}">
-                <a16:creationId xmlns:a16="http://schemas.microsoft.com/office/drawing/2014/main" id="{0009F1CF-8171-46C5-90DA-3BAD2DA55A53}"/>
-              </a:ext>
-            </a:extLst>
-          </p:cNvPr>
-          <p:cNvSpPr>
-            <a:spLocks noGrp="1"/>
-          </p:cNvSpPr>
-          <p:nvPr>
-            <p:ph type="title"/>
-          </p:nvPr>
-        </p:nvSpPr>
-        <p:spPr/>
-        <p:txBody>
-          <a:bodyPr/>
-          <a:lstStyle/>
-          <a:p>
-            <a:r>
-              <a:rPr lang="pt-BR" dirty="0"/>
-              <a:t>N3</a:t>
-            </a:r>
-          </a:p>
-        </p:txBody>
-      </p:sp>
-      <p:sp>
-        <p:nvSpPr>
-          <p:cNvPr id="4" name="Retângulo Arredondado 2">
-            <a:extLst>
-              <a:ext uri="{FF2B5EF4-FFF2-40B4-BE49-F238E27FC236}">
-                <a16:creationId xmlns:a16="http://schemas.microsoft.com/office/drawing/2014/main" id="{C9D671E0-C2FF-4E9E-9209-B25586A23789}"/>
-              </a:ext>
-            </a:extLst>
-          </p:cNvPr>
-          <p:cNvSpPr/>
-          <p:nvPr/>
-        </p:nvSpPr>
-        <p:spPr>
-          <a:xfrm>
-            <a:off x="492262" y="1689084"/>
-            <a:ext cx="1982978" cy="1282890"/>
-          </a:xfrm>
-          <a:prstGeom prst="roundRect">
-            <a:avLst/>
-          </a:prstGeom>
-          <a:ln>
-            <a:solidFill>
-              <a:schemeClr val="accent1">
-                <a:lumMod val="50000"/>
-              </a:schemeClr>
-            </a:solidFill>
-          </a:ln>
-        </p:spPr>
-        <p:style>
-          <a:lnRef idx="2">
-            <a:schemeClr val="accent6"/>
-          </a:lnRef>
-          <a:fillRef idx="1">
-            <a:schemeClr val="lt1"/>
-          </a:fillRef>
-          <a:effectRef idx="0">
-            <a:schemeClr val="accent6"/>
-          </a:effectRef>
-          <a:fontRef idx="minor">
-            <a:schemeClr val="dk1"/>
-          </a:fontRef>
-        </p:style>
-        <p:txBody>
-          <a:bodyPr rtlCol="0" anchor="ctr"/>
-          <a:lstStyle/>
-          <a:p>
-            <a:pPr algn="ctr"/>
-            <a:r>
-              <a:rPr lang="pt-BR" dirty="0"/>
-              <a:t>Analisar o Caso</a:t>
-            </a:r>
-          </a:p>
-        </p:txBody>
-      </p:sp>
-      <p:sp>
-        <p:nvSpPr>
-          <p:cNvPr id="5" name="Retângulo Arredondado 12">
-            <a:extLst>
-              <a:ext uri="{FF2B5EF4-FFF2-40B4-BE49-F238E27FC236}">
-                <a16:creationId xmlns:a16="http://schemas.microsoft.com/office/drawing/2014/main" id="{D850282E-AFE2-43CE-B327-0804CE34B68C}"/>
-              </a:ext>
-            </a:extLst>
-          </p:cNvPr>
-          <p:cNvSpPr/>
-          <p:nvPr/>
-        </p:nvSpPr>
-        <p:spPr>
-          <a:xfrm>
-            <a:off x="6138755" y="1594193"/>
-            <a:ext cx="1524206" cy="987188"/>
-          </a:xfrm>
-          <a:prstGeom prst="roundRect">
-            <a:avLst/>
-          </a:prstGeom>
-          <a:ln>
-            <a:solidFill>
-              <a:schemeClr val="accent1">
-                <a:lumMod val="50000"/>
-              </a:schemeClr>
-            </a:solidFill>
-          </a:ln>
-        </p:spPr>
-        <p:style>
-          <a:lnRef idx="2">
-            <a:schemeClr val="accent6"/>
-          </a:lnRef>
-          <a:fillRef idx="1">
-            <a:schemeClr val="lt1"/>
-          </a:fillRef>
-          <a:effectRef idx="0">
-            <a:schemeClr val="accent6"/>
-          </a:effectRef>
-          <a:fontRef idx="minor">
-            <a:schemeClr val="dk1"/>
-          </a:fontRef>
-        </p:style>
-        <p:txBody>
-          <a:bodyPr rtlCol="0" anchor="ctr"/>
-          <a:lstStyle/>
-          <a:p>
-            <a:pPr algn="ctr"/>
-            <a:r>
-              <a:rPr lang="pt-BR" sz="1600" dirty="0"/>
-              <a:t>Aplicar Solução definitiva</a:t>
-            </a:r>
-          </a:p>
-        </p:txBody>
-      </p:sp>
-      <p:cxnSp>
-        <p:nvCxnSpPr>
-          <p:cNvPr id="7" name="Conector reto 6">
-            <a:extLst>
-              <a:ext uri="{FF2B5EF4-FFF2-40B4-BE49-F238E27FC236}">
-                <a16:creationId xmlns:a16="http://schemas.microsoft.com/office/drawing/2014/main" id="{E0FE34A4-92DB-459D-AC7E-257DE583620C}"/>
-              </a:ext>
-            </a:extLst>
-          </p:cNvPr>
-          <p:cNvCxnSpPr>
-            <a:cxnSpLocks/>
-          </p:cNvCxnSpPr>
-          <p:nvPr/>
-        </p:nvCxnSpPr>
-        <p:spPr>
-          <a:xfrm>
-            <a:off x="9270816" y="3717153"/>
-            <a:ext cx="17842" cy="0"/>
-          </a:xfrm>
-          <a:prstGeom prst="line">
-            <a:avLst/>
-          </a:prstGeom>
-          <a:ln>
-            <a:solidFill>
-              <a:schemeClr val="accent1">
-                <a:lumMod val="50000"/>
-              </a:schemeClr>
-            </a:solidFill>
-          </a:ln>
-        </p:spPr>
-        <p:style>
-          <a:lnRef idx="1">
-            <a:schemeClr val="accent6"/>
-          </a:lnRef>
-          <a:fillRef idx="0">
-            <a:schemeClr val="accent6"/>
-          </a:fillRef>
-          <a:effectRef idx="0">
-            <a:schemeClr val="accent6"/>
-          </a:effectRef>
-          <a:fontRef idx="minor">
-            <a:schemeClr val="tx1"/>
-          </a:fontRef>
-        </p:style>
-      </p:cxnSp>
-      <p:sp>
-        <p:nvSpPr>
-          <p:cNvPr id="8" name="Retângulo Arredondado 34">
-            <a:extLst>
-              <a:ext uri="{FF2B5EF4-FFF2-40B4-BE49-F238E27FC236}">
-                <a16:creationId xmlns:a16="http://schemas.microsoft.com/office/drawing/2014/main" id="{FF635A3A-E0C5-46A9-8665-3427E5494FD9}"/>
-              </a:ext>
-            </a:extLst>
-          </p:cNvPr>
-          <p:cNvSpPr/>
-          <p:nvPr/>
-        </p:nvSpPr>
-        <p:spPr>
-          <a:xfrm>
-            <a:off x="4351564" y="5508229"/>
-            <a:ext cx="1909511" cy="768331"/>
-          </a:xfrm>
-          <a:prstGeom prst="roundRect">
-            <a:avLst/>
-          </a:prstGeom>
-          <a:ln>
-            <a:solidFill>
-              <a:schemeClr val="accent1">
-                <a:lumMod val="50000"/>
-              </a:schemeClr>
-            </a:solidFill>
-          </a:ln>
-        </p:spPr>
-        <p:style>
-          <a:lnRef idx="2">
-            <a:schemeClr val="accent6"/>
-          </a:lnRef>
-          <a:fillRef idx="1">
-            <a:schemeClr val="lt1"/>
-          </a:fillRef>
-          <a:effectRef idx="0">
-            <a:schemeClr val="accent6"/>
-          </a:effectRef>
-          <a:fontRef idx="minor">
-            <a:schemeClr val="dk1"/>
-          </a:fontRef>
-        </p:style>
-        <p:txBody>
-          <a:bodyPr rtlCol="0" anchor="ctr"/>
-          <a:lstStyle/>
-          <a:p>
-            <a:pPr algn="ctr"/>
-            <a:r>
-              <a:rPr lang="pt-BR" dirty="0"/>
-              <a:t>Processo de GMUD</a:t>
-            </a:r>
-          </a:p>
-        </p:txBody>
-      </p:sp>
-      <p:sp>
-        <p:nvSpPr>
-          <p:cNvPr id="11" name="Elipse 10">
-            <a:extLst>
-              <a:ext uri="{FF2B5EF4-FFF2-40B4-BE49-F238E27FC236}">
-                <a16:creationId xmlns:a16="http://schemas.microsoft.com/office/drawing/2014/main" id="{4D38194C-51FE-48B0-93A4-0983DFE9FB33}"/>
-              </a:ext>
-            </a:extLst>
-          </p:cNvPr>
-          <p:cNvSpPr/>
-          <p:nvPr/>
-        </p:nvSpPr>
-        <p:spPr>
-          <a:xfrm>
-            <a:off x="10206803" y="3079625"/>
-            <a:ext cx="931798" cy="914400"/>
-          </a:xfrm>
-          <a:prstGeom prst="ellipse">
-            <a:avLst/>
-          </a:prstGeom>
-          <a:ln>
-            <a:solidFill>
-              <a:schemeClr val="accent1">
-                <a:lumMod val="50000"/>
-              </a:schemeClr>
-            </a:solidFill>
-          </a:ln>
-        </p:spPr>
-        <p:style>
-          <a:lnRef idx="2">
-            <a:schemeClr val="accent3"/>
-          </a:lnRef>
-          <a:fillRef idx="1">
-            <a:schemeClr val="lt1"/>
-          </a:fillRef>
-          <a:effectRef idx="0">
-            <a:schemeClr val="accent3"/>
-          </a:effectRef>
-          <a:fontRef idx="minor">
-            <a:schemeClr val="dk1"/>
-          </a:fontRef>
-        </p:style>
-        <p:txBody>
-          <a:bodyPr rtlCol="0" anchor="ctr"/>
-          <a:lstStyle/>
-          <a:p>
-            <a:pPr algn="ctr"/>
-            <a:r>
-              <a:rPr lang="pt-BR" dirty="0">
-                <a:solidFill>
-                  <a:schemeClr val="tx1"/>
-                </a:solidFill>
-              </a:rPr>
-              <a:t>Fim</a:t>
-            </a:r>
-          </a:p>
-        </p:txBody>
-      </p:sp>
-      <p:cxnSp>
-        <p:nvCxnSpPr>
-          <p:cNvPr id="13" name="Conector: Angulado 12">
-            <a:extLst>
-              <a:ext uri="{FF2B5EF4-FFF2-40B4-BE49-F238E27FC236}">
-                <a16:creationId xmlns:a16="http://schemas.microsoft.com/office/drawing/2014/main" id="{B73B5EC7-04E5-4886-AF21-50ADB4D33307}"/>
-              </a:ext>
-            </a:extLst>
-          </p:cNvPr>
-          <p:cNvCxnSpPr>
-            <a:cxnSpLocks/>
-            <a:endCxn id="11" idx="0"/>
-          </p:cNvCxnSpPr>
-          <p:nvPr/>
-        </p:nvCxnSpPr>
-        <p:spPr>
-          <a:xfrm>
-            <a:off x="7662961" y="1973127"/>
-            <a:ext cx="3009741" cy="1106498"/>
-          </a:xfrm>
-          <a:prstGeom prst="bentConnector2">
-            <a:avLst/>
-          </a:prstGeom>
-          <a:ln>
-            <a:solidFill>
-              <a:schemeClr val="accent1">
-                <a:lumMod val="50000"/>
-              </a:schemeClr>
-            </a:solidFill>
-          </a:ln>
-        </p:spPr>
-        <p:style>
-          <a:lnRef idx="1">
-            <a:schemeClr val="accent1"/>
-          </a:lnRef>
-          <a:fillRef idx="0">
-            <a:schemeClr val="accent1"/>
-          </a:fillRef>
-          <a:effectRef idx="0">
-            <a:schemeClr val="accent1"/>
-          </a:effectRef>
-          <a:fontRef idx="minor">
-            <a:schemeClr val="tx1"/>
-          </a:fontRef>
-        </p:style>
-      </p:cxnSp>
-      <p:sp>
-        <p:nvSpPr>
-          <p:cNvPr id="15" name="Losango 14">
-            <a:extLst>
-              <a:ext uri="{FF2B5EF4-FFF2-40B4-BE49-F238E27FC236}">
-                <a16:creationId xmlns:a16="http://schemas.microsoft.com/office/drawing/2014/main" id="{2E1954B8-C2DD-4D43-9B64-7372F5DFCABF}"/>
-              </a:ext>
-            </a:extLst>
-          </p:cNvPr>
-          <p:cNvSpPr/>
-          <p:nvPr/>
-        </p:nvSpPr>
-        <p:spPr>
-          <a:xfrm>
-            <a:off x="4591852" y="3207374"/>
-            <a:ext cx="1047990" cy="987189"/>
-          </a:xfrm>
-          <a:prstGeom prst="diamond">
-            <a:avLst/>
-          </a:prstGeom>
-          <a:ln>
-            <a:solidFill>
-              <a:schemeClr val="accent1">
-                <a:lumMod val="50000"/>
-              </a:schemeClr>
-            </a:solidFill>
-          </a:ln>
-        </p:spPr>
-        <p:style>
-          <a:lnRef idx="0">
-            <a:schemeClr val="accent1"/>
-          </a:lnRef>
-          <a:fillRef idx="3">
-            <a:schemeClr val="accent1"/>
-          </a:fillRef>
-          <a:effectRef idx="3">
-            <a:schemeClr val="accent1"/>
-          </a:effectRef>
-          <a:fontRef idx="minor">
-            <a:schemeClr val="lt1"/>
-          </a:fontRef>
-        </p:style>
-        <p:txBody>
-          <a:bodyPr rtlCol="0" anchor="ctr"/>
-          <a:lstStyle/>
-          <a:p>
-            <a:pPr algn="ctr"/>
-            <a:endParaRPr lang="pt-BR"/>
-          </a:p>
-        </p:txBody>
-      </p:sp>
-      <p:cxnSp>
-        <p:nvCxnSpPr>
-          <p:cNvPr id="16" name="Conector: Angulado 15">
-            <a:extLst>
-              <a:ext uri="{FF2B5EF4-FFF2-40B4-BE49-F238E27FC236}">
-                <a16:creationId xmlns:a16="http://schemas.microsoft.com/office/drawing/2014/main" id="{BF82B788-BAD9-426E-B45B-DF8CFB54D30F}"/>
-              </a:ext>
-            </a:extLst>
-          </p:cNvPr>
-          <p:cNvCxnSpPr>
-            <a:cxnSpLocks/>
-            <a:stCxn id="5" idx="1"/>
-            <a:endCxn id="15" idx="0"/>
-          </p:cNvCxnSpPr>
-          <p:nvPr/>
-        </p:nvCxnSpPr>
-        <p:spPr>
-          <a:xfrm rot="10800000" flipV="1">
-            <a:off x="5115847" y="2087786"/>
-            <a:ext cx="1022908" cy="1119587"/>
-          </a:xfrm>
-          <a:prstGeom prst="bentConnector2">
-            <a:avLst/>
-          </a:prstGeom>
-          <a:ln>
-            <a:solidFill>
-              <a:schemeClr val="accent1">
-                <a:lumMod val="50000"/>
-              </a:schemeClr>
-            </a:solidFill>
-          </a:ln>
-        </p:spPr>
-        <p:style>
-          <a:lnRef idx="1">
-            <a:schemeClr val="accent1"/>
-          </a:lnRef>
-          <a:fillRef idx="0">
-            <a:schemeClr val="accent1"/>
-          </a:fillRef>
-          <a:effectRef idx="0">
-            <a:schemeClr val="accent1"/>
-          </a:effectRef>
-          <a:fontRef idx="minor">
-            <a:schemeClr val="tx1"/>
-          </a:fontRef>
-        </p:style>
-      </p:cxnSp>
-      <p:sp>
-        <p:nvSpPr>
-          <p:cNvPr id="17" name="CaixaDeTexto 16">
-            <a:extLst>
-              <a:ext uri="{FF2B5EF4-FFF2-40B4-BE49-F238E27FC236}">
-                <a16:creationId xmlns:a16="http://schemas.microsoft.com/office/drawing/2014/main" id="{75C948C6-D1A4-4E06-8E27-CD225881FD20}"/>
-              </a:ext>
-            </a:extLst>
-          </p:cNvPr>
-          <p:cNvSpPr txBox="1"/>
-          <p:nvPr/>
-        </p:nvSpPr>
-        <p:spPr>
-          <a:xfrm>
-            <a:off x="5181594" y="1709042"/>
-            <a:ext cx="555096" cy="369332"/>
-          </a:xfrm>
-          <a:prstGeom prst="rect">
-            <a:avLst/>
-          </a:prstGeom>
-          <a:noFill/>
-          <a:ln>
-            <a:solidFill>
-              <a:schemeClr val="accent1">
-                <a:lumMod val="50000"/>
-              </a:schemeClr>
-            </a:solidFill>
-          </a:ln>
-        </p:spPr>
-        <p:txBody>
-          <a:bodyPr wrap="square" rtlCol="0">
-            <a:spAutoFit/>
-          </a:bodyPr>
-          <a:lstStyle/>
-          <a:p>
-            <a:r>
-              <a:rPr lang="pt-BR" dirty="0"/>
-              <a:t>Sim</a:t>
-            </a:r>
-          </a:p>
-        </p:txBody>
-      </p:sp>
-      <p:cxnSp>
-        <p:nvCxnSpPr>
-          <p:cNvPr id="18" name="Conector: Angulado 17">
-            <a:extLst>
-              <a:ext uri="{FF2B5EF4-FFF2-40B4-BE49-F238E27FC236}">
-                <a16:creationId xmlns:a16="http://schemas.microsoft.com/office/drawing/2014/main" id="{B0A078DD-A660-441C-BBEB-F0153D8DAF85}"/>
-              </a:ext>
-            </a:extLst>
-          </p:cNvPr>
-          <p:cNvCxnSpPr>
-            <a:cxnSpLocks/>
-          </p:cNvCxnSpPr>
-          <p:nvPr/>
-        </p:nvCxnSpPr>
-        <p:spPr>
-          <a:xfrm rot="16200000" flipH="1">
-            <a:off x="4453571" y="4851396"/>
-            <a:ext cx="1313670" cy="2"/>
-          </a:xfrm>
-          <a:prstGeom prst="bentConnector3">
-            <a:avLst>
-              <a:gd name="adj1" fmla="val 50000"/>
-            </a:avLst>
-          </a:prstGeom>
-          <a:ln>
-            <a:solidFill>
-              <a:schemeClr val="accent1">
-                <a:lumMod val="50000"/>
-              </a:schemeClr>
-            </a:solidFill>
-          </a:ln>
-        </p:spPr>
-        <p:style>
-          <a:lnRef idx="1">
-            <a:schemeClr val="accent1"/>
-          </a:lnRef>
-          <a:fillRef idx="0">
-            <a:schemeClr val="accent1"/>
-          </a:fillRef>
-          <a:effectRef idx="0">
-            <a:schemeClr val="accent1"/>
-          </a:effectRef>
-          <a:fontRef idx="minor">
-            <a:schemeClr val="tx1"/>
-          </a:fontRef>
-        </p:style>
-      </p:cxnSp>
-      <p:sp>
-        <p:nvSpPr>
-          <p:cNvPr id="19" name="CaixaDeTexto 18">
-            <a:extLst>
-              <a:ext uri="{FF2B5EF4-FFF2-40B4-BE49-F238E27FC236}">
-                <a16:creationId xmlns:a16="http://schemas.microsoft.com/office/drawing/2014/main" id="{D762038F-53A0-4FF2-9711-660863E90DFE}"/>
-              </a:ext>
-            </a:extLst>
-          </p:cNvPr>
-          <p:cNvSpPr txBox="1"/>
-          <p:nvPr/>
-        </p:nvSpPr>
-        <p:spPr>
-          <a:xfrm>
-            <a:off x="5106783" y="4521040"/>
-            <a:ext cx="595565" cy="369332"/>
-          </a:xfrm>
-          <a:prstGeom prst="rect">
-            <a:avLst/>
-          </a:prstGeom>
-          <a:noFill/>
-          <a:ln>
-            <a:solidFill>
-              <a:schemeClr val="accent1">
-                <a:lumMod val="50000"/>
-              </a:schemeClr>
-            </a:solidFill>
-          </a:ln>
-        </p:spPr>
-        <p:txBody>
-          <a:bodyPr wrap="square" rtlCol="0">
-            <a:spAutoFit/>
-          </a:bodyPr>
-          <a:lstStyle/>
-          <a:p>
-            <a:r>
-              <a:rPr lang="pt-BR" dirty="0"/>
-              <a:t>Não</a:t>
-            </a:r>
-          </a:p>
-        </p:txBody>
-      </p:sp>
-      <p:sp>
-        <p:nvSpPr>
-          <p:cNvPr id="23" name="Retângulo Arredondado 2">
-            <a:extLst>
-              <a:ext uri="{FF2B5EF4-FFF2-40B4-BE49-F238E27FC236}">
-                <a16:creationId xmlns:a16="http://schemas.microsoft.com/office/drawing/2014/main" id="{6A33D674-C9AB-4A4B-822F-27E8F64146D8}"/>
-              </a:ext>
-            </a:extLst>
-          </p:cNvPr>
-          <p:cNvSpPr/>
-          <p:nvPr/>
-        </p:nvSpPr>
-        <p:spPr>
-          <a:xfrm>
-            <a:off x="246954" y="4194561"/>
-            <a:ext cx="2513043" cy="760613"/>
-          </a:xfrm>
-          <a:prstGeom prst="roundRect">
-            <a:avLst/>
-          </a:prstGeom>
-          <a:ln>
-            <a:solidFill>
-              <a:schemeClr val="accent1">
-                <a:lumMod val="50000"/>
-              </a:schemeClr>
-            </a:solidFill>
-          </a:ln>
-        </p:spPr>
-        <p:style>
-          <a:lnRef idx="2">
-            <a:schemeClr val="accent6"/>
-          </a:lnRef>
-          <a:fillRef idx="1">
-            <a:schemeClr val="lt1"/>
-          </a:fillRef>
-          <a:effectRef idx="0">
-            <a:schemeClr val="accent6"/>
-          </a:effectRef>
-          <a:fontRef idx="minor">
-            <a:schemeClr val="dk1"/>
-          </a:fontRef>
-        </p:style>
-        <p:txBody>
-          <a:bodyPr rtlCol="0" anchor="ctr"/>
-          <a:lstStyle/>
-          <a:p>
-            <a:pPr algn="ctr"/>
-            <a:r>
-              <a:rPr lang="pt-BR" dirty="0"/>
-              <a:t>Pode ser solucionado sem parada no serviço?</a:t>
-            </a:r>
-          </a:p>
-        </p:txBody>
-      </p:sp>
-      <p:cxnSp>
-        <p:nvCxnSpPr>
-          <p:cNvPr id="25" name="Conector: Angulado 24">
-            <a:extLst>
-              <a:ext uri="{FF2B5EF4-FFF2-40B4-BE49-F238E27FC236}">
-                <a16:creationId xmlns:a16="http://schemas.microsoft.com/office/drawing/2014/main" id="{7639A86C-8E7D-491B-9815-3E1CC2407E6F}"/>
-              </a:ext>
-            </a:extLst>
-          </p:cNvPr>
-          <p:cNvCxnSpPr>
-            <a:cxnSpLocks/>
-            <a:stCxn id="15" idx="1"/>
-            <a:endCxn id="23" idx="3"/>
-          </p:cNvCxnSpPr>
-          <p:nvPr/>
-        </p:nvCxnSpPr>
-        <p:spPr>
-          <a:xfrm rot="10800000" flipV="1">
-            <a:off x="2759998" y="3700968"/>
-            <a:ext cx="1831855" cy="873899"/>
-          </a:xfrm>
-          <a:prstGeom prst="bentConnector3">
-            <a:avLst>
-              <a:gd name="adj1" fmla="val 50000"/>
-            </a:avLst>
-          </a:prstGeom>
-          <a:ln>
-            <a:solidFill>
-              <a:schemeClr val="accent1">
-                <a:lumMod val="50000"/>
-              </a:schemeClr>
-            </a:solidFill>
-          </a:ln>
-        </p:spPr>
-        <p:style>
-          <a:lnRef idx="1">
-            <a:schemeClr val="accent1"/>
-          </a:lnRef>
-          <a:fillRef idx="0">
-            <a:schemeClr val="accent1"/>
-          </a:fillRef>
-          <a:effectRef idx="0">
-            <a:schemeClr val="accent1"/>
-          </a:effectRef>
-          <a:fontRef idx="minor">
-            <a:schemeClr val="tx1"/>
-          </a:fontRef>
-        </p:style>
-      </p:cxnSp>
-      <p:cxnSp>
-        <p:nvCxnSpPr>
-          <p:cNvPr id="34" name="Conector: Angulado 33">
-            <a:extLst>
-              <a:ext uri="{FF2B5EF4-FFF2-40B4-BE49-F238E27FC236}">
-                <a16:creationId xmlns:a16="http://schemas.microsoft.com/office/drawing/2014/main" id="{8A9473F2-A4E4-4D53-B6CE-012A135145A3}"/>
-              </a:ext>
-            </a:extLst>
-          </p:cNvPr>
-          <p:cNvCxnSpPr>
-            <a:cxnSpLocks/>
-          </p:cNvCxnSpPr>
-          <p:nvPr/>
-        </p:nvCxnSpPr>
-        <p:spPr>
-          <a:xfrm rot="16200000" flipH="1">
-            <a:off x="779633" y="3583266"/>
-            <a:ext cx="1222587" cy="2"/>
-          </a:xfrm>
-          <a:prstGeom prst="bentConnector3">
-            <a:avLst>
-              <a:gd name="adj1" fmla="val 50000"/>
-            </a:avLst>
-          </a:prstGeom>
-          <a:ln>
-            <a:solidFill>
-              <a:schemeClr val="accent1">
-                <a:lumMod val="50000"/>
-              </a:schemeClr>
-            </a:solidFill>
-          </a:ln>
-        </p:spPr>
-        <p:style>
-          <a:lnRef idx="1">
-            <a:schemeClr val="accent1"/>
-          </a:lnRef>
-          <a:fillRef idx="0">
-            <a:schemeClr val="accent1"/>
-          </a:fillRef>
-          <a:effectRef idx="0">
-            <a:schemeClr val="accent1"/>
-          </a:effectRef>
-          <a:fontRef idx="minor">
-            <a:schemeClr val="tx1"/>
-          </a:fontRef>
-        </p:style>
-      </p:cxnSp>
-      <p:sp>
-        <p:nvSpPr>
-          <p:cNvPr id="37" name="Retângulo Arredondado 34">
-            <a:extLst>
-              <a:ext uri="{FF2B5EF4-FFF2-40B4-BE49-F238E27FC236}">
-                <a16:creationId xmlns:a16="http://schemas.microsoft.com/office/drawing/2014/main" id="{4062EF14-8E08-4F5E-9DDF-872DF53B4AE2}"/>
-              </a:ext>
-            </a:extLst>
-          </p:cNvPr>
-          <p:cNvSpPr/>
-          <p:nvPr/>
-        </p:nvSpPr>
-        <p:spPr>
-          <a:xfrm>
-            <a:off x="7883797" y="5508228"/>
-            <a:ext cx="2107851" cy="768331"/>
-          </a:xfrm>
-          <a:prstGeom prst="roundRect">
-            <a:avLst/>
-          </a:prstGeom>
-          <a:ln>
-            <a:solidFill>
-              <a:schemeClr val="accent1">
-                <a:lumMod val="50000"/>
-              </a:schemeClr>
-            </a:solidFill>
-          </a:ln>
-        </p:spPr>
-        <p:style>
-          <a:lnRef idx="2">
-            <a:schemeClr val="accent6"/>
-          </a:lnRef>
-          <a:fillRef idx="1">
-            <a:schemeClr val="lt1"/>
-          </a:fillRef>
-          <a:effectRef idx="0">
-            <a:schemeClr val="accent6"/>
-          </a:effectRef>
-          <a:fontRef idx="minor">
-            <a:schemeClr val="dk1"/>
-          </a:fontRef>
-        </p:style>
-        <p:txBody>
-          <a:bodyPr rtlCol="0" anchor="ctr"/>
-          <a:lstStyle/>
-          <a:p>
-            <a:pPr algn="ctr"/>
-            <a:r>
-              <a:rPr lang="pt-BR" dirty="0"/>
-              <a:t>Aplicar solução definitiva</a:t>
-            </a:r>
-          </a:p>
-        </p:txBody>
-      </p:sp>
-      <p:cxnSp>
-        <p:nvCxnSpPr>
-          <p:cNvPr id="38" name="Conector: Angulado 37">
-            <a:extLst>
-              <a:ext uri="{FF2B5EF4-FFF2-40B4-BE49-F238E27FC236}">
-                <a16:creationId xmlns:a16="http://schemas.microsoft.com/office/drawing/2014/main" id="{134C49EC-4F99-48D1-8B6F-A6C5E074A789}"/>
-              </a:ext>
-            </a:extLst>
-          </p:cNvPr>
-          <p:cNvCxnSpPr>
-            <a:cxnSpLocks/>
-            <a:endCxn id="37" idx="1"/>
-          </p:cNvCxnSpPr>
-          <p:nvPr/>
-        </p:nvCxnSpPr>
-        <p:spPr>
-          <a:xfrm>
-            <a:off x="6261075" y="5892393"/>
-            <a:ext cx="1622722" cy="1"/>
-          </a:xfrm>
-          <a:prstGeom prst="bentConnector3">
-            <a:avLst>
-              <a:gd name="adj1" fmla="val 50000"/>
-            </a:avLst>
-          </a:prstGeom>
-          <a:ln>
-            <a:solidFill>
-              <a:schemeClr val="accent1">
-                <a:lumMod val="50000"/>
-              </a:schemeClr>
-            </a:solidFill>
-          </a:ln>
-        </p:spPr>
-        <p:style>
-          <a:lnRef idx="1">
-            <a:schemeClr val="accent1"/>
-          </a:lnRef>
-          <a:fillRef idx="0">
-            <a:schemeClr val="accent1"/>
-          </a:fillRef>
-          <a:effectRef idx="0">
-            <a:schemeClr val="accent1"/>
-          </a:effectRef>
-          <a:fontRef idx="minor">
-            <a:schemeClr val="tx1"/>
-          </a:fontRef>
-        </p:style>
-      </p:cxnSp>
-      <p:cxnSp>
-        <p:nvCxnSpPr>
-          <p:cNvPr id="41" name="Conector: Angulado 40">
-            <a:extLst>
-              <a:ext uri="{FF2B5EF4-FFF2-40B4-BE49-F238E27FC236}">
-                <a16:creationId xmlns:a16="http://schemas.microsoft.com/office/drawing/2014/main" id="{F27F7C4F-AF3A-456C-B366-A29CDAC8F7D2}"/>
-              </a:ext>
-            </a:extLst>
-          </p:cNvPr>
-          <p:cNvCxnSpPr>
-            <a:cxnSpLocks/>
-            <a:endCxn id="11" idx="4"/>
-          </p:cNvCxnSpPr>
-          <p:nvPr/>
-        </p:nvCxnSpPr>
-        <p:spPr>
-          <a:xfrm rot="5400000" flipH="1" flipV="1">
-            <a:off x="9438354" y="4547320"/>
-            <a:ext cx="1787642" cy="681053"/>
-          </a:xfrm>
-          <a:prstGeom prst="bentConnector3">
-            <a:avLst>
-              <a:gd name="adj1" fmla="val 423"/>
-            </a:avLst>
-          </a:prstGeom>
-          <a:ln>
-            <a:solidFill>
-              <a:schemeClr val="accent1">
-                <a:lumMod val="50000"/>
-              </a:schemeClr>
-            </a:solidFill>
-          </a:ln>
-        </p:spPr>
-        <p:style>
-          <a:lnRef idx="1">
-            <a:schemeClr val="accent1"/>
-          </a:lnRef>
-          <a:fillRef idx="0">
-            <a:schemeClr val="accent1"/>
-          </a:fillRef>
-          <a:effectRef idx="0">
-            <a:schemeClr val="accent1"/>
-          </a:effectRef>
-          <a:fontRef idx="minor">
-            <a:schemeClr val="tx1"/>
-          </a:fontRef>
-        </p:style>
-      </p:cxnSp>
-    </p:spTree>
-    <p:extLst>
-      <p:ext uri="{BB962C8B-B14F-4D97-AF65-F5344CB8AC3E}">
-        <p14:creationId xmlns:p14="http://schemas.microsoft.com/office/powerpoint/2010/main" val="2247182570"/>
-      </p:ext>
-    </p:extLst>
-  </p:cSld>
-  <p:clrMapOvr>
-    <a:masterClrMapping/>
-  </p:clrMapOvr>
-  <mc:AlternateContent xmlns:mc="http://schemas.openxmlformats.org/markup-compatibility/2006" xmlns:p14="http://schemas.microsoft.com/office/powerpoint/2010/main">
-    <mc:Choice Requires="p14">
-      <p:transition spd="med" p14:dur="700">
-        <p:fade/>
-      </p:transition>
-    </mc:Choice>
-    <mc:Fallback xmlns="">
-      <p:transition spd="med">
-        <p:fade/>
-      </p:transition>
-    </mc:Fallback>
-  </mc:AlternateContent>
-</p:sld>
-</file>
-
-<file path=ppt/slides/slide34.xml><?xml version="1.0" encoding="utf-8"?>
-<p:sld xmlns:a="http://schemas.openxmlformats.org/drawingml/2006/main" xmlns:r="http://schemas.openxmlformats.org/officeDocument/2006/relationships" xmlns:p="http://schemas.openxmlformats.org/presentationml/2006/main">
-  <p:cSld>
-    <p:spTree>
-      <p:nvGrpSpPr>
-        <p:cNvPr id="1" name=""/>
-        <p:cNvGrpSpPr/>
-        <p:nvPr/>
-      </p:nvGrpSpPr>
-      <p:grpSpPr>
-        <a:xfrm>
-          <a:off x="0" y="0"/>
-          <a:ext cx="0" cy="0"/>
-          <a:chOff x="0" y="0"/>
-          <a:chExt cx="0" cy="0"/>
-        </a:xfrm>
-      </p:grpSpPr>
-      <p:sp>
-        <p:nvSpPr>
-          <p:cNvPr id="2" name="Título 1">
-            <a:extLst>
-              <a:ext uri="{FF2B5EF4-FFF2-40B4-BE49-F238E27FC236}">
                 <a16:creationId xmlns:a16="http://schemas.microsoft.com/office/drawing/2014/main" id="{A8105C9A-20D0-4A00-9D0A-A8B3207BAE62}"/>
               </a:ext>
             </a:extLst>
@@ -19148,22 +15992,13 @@
   <p:clrMapOvr>
     <a:masterClrMapping/>
   </p:clrMapOvr>
-  <mc:AlternateContent xmlns:mc="http://schemas.openxmlformats.org/markup-compatibility/2006" xmlns:p14="http://schemas.microsoft.com/office/powerpoint/2010/main">
-    <mc:Choice Requires="p14">
-      <p:transition spd="med" p14:dur="700">
-        <p:fade/>
-      </p:transition>
-    </mc:Choice>
-    <mc:Fallback xmlns="">
-      <p:transition spd="med">
-        <p:fade/>
-      </p:transition>
-    </mc:Fallback>
-  </mc:AlternateContent>
+  <p:transition spd="slow">
+    <p:push dir="u"/>
+  </p:transition>
 </p:sld>
 </file>
 
-<file path=ppt/slides/slide35.xml><?xml version="1.0" encoding="utf-8"?>
+<file path=ppt/slides/slide34.xml><?xml version="1.0" encoding="utf-8"?>
 <p:sld xmlns:a="http://schemas.openxmlformats.org/drawingml/2006/main" xmlns:r="http://schemas.openxmlformats.org/officeDocument/2006/relationships" xmlns:p="http://schemas.openxmlformats.org/presentationml/2006/main">
   <p:cSld>
     <p:spTree>
@@ -20129,7 +16964,7 @@
 </p:sld>
 </file>
 
-<file path=ppt/slides/slide36.xml><?xml version="1.0" encoding="utf-8"?>
+<file path=ppt/slides/slide35.xml><?xml version="1.0" encoding="utf-8"?>
 <p:sld xmlns:a="http://schemas.openxmlformats.org/drawingml/2006/main" xmlns:r="http://schemas.openxmlformats.org/officeDocument/2006/relationships" xmlns:p="http://schemas.openxmlformats.org/presentationml/2006/main">
   <p:cSld>
     <p:spTree>
@@ -20605,13 +17440,13 @@
   <p:clrMapOvr>
     <a:masterClrMapping/>
   </p:clrMapOvr>
-  <mc:AlternateContent xmlns:mc="http://schemas.openxmlformats.org/markup-compatibility/2006" xmlns:p159="http://schemas.microsoft.com/office/powerpoint/2015/09/main">
-    <mc:Choice Requires="p159">
+  <mc:AlternateContent xmlns:mc="http://schemas.openxmlformats.org/markup-compatibility/2006">
+    <mc:Choice xmlns:p159="http://schemas.microsoft.com/office/powerpoint/2015/09/main" Requires="p159">
       <p:transition xmlns:p14="http://schemas.microsoft.com/office/powerpoint/2010/main" spd="slow" p14:dur="2000">
         <p159:morph option="byObject"/>
       </p:transition>
     </mc:Choice>
-    <mc:Fallback xmlns="">
+    <mc:Fallback>
       <p:transition spd="slow">
         <p:fade/>
       </p:transition>
@@ -20620,7 +17455,7 @@
 </p:sld>
 </file>
 
-<file path=ppt/slides/slide37.xml><?xml version="1.0" encoding="utf-8"?>
+<file path=ppt/slides/slide36.xml><?xml version="1.0" encoding="utf-8"?>
 <p:sld xmlns:a="http://schemas.openxmlformats.org/drawingml/2006/main" xmlns:r="http://schemas.openxmlformats.org/officeDocument/2006/relationships" xmlns:p="http://schemas.openxmlformats.org/presentationml/2006/main">
   <p:cSld>
     <p:spTree>
@@ -20992,7 +17827,7 @@
 </p:sld>
 </file>
 
-<file path=ppt/slides/slide38.xml><?xml version="1.0" encoding="utf-8"?>
+<file path=ppt/slides/slide37.xml><?xml version="1.0" encoding="utf-8"?>
 <p:sld xmlns:a="http://schemas.openxmlformats.org/drawingml/2006/main" xmlns:r="http://schemas.openxmlformats.org/officeDocument/2006/relationships" xmlns:p="http://schemas.openxmlformats.org/presentationml/2006/main">
   <p:cSld>
     <p:spTree>

</xml_diff>